<commit_message>
Update the new document.
</commit_message>
<xml_diff>
--- a/8bit_design/CPU.pptx
+++ b/8bit_design/CPU.pptx
@@ -10,6 +10,7 @@
     <p:sldId id="258" r:id="rId4"/>
     <p:sldId id="261" r:id="rId5"/>
     <p:sldId id="260" r:id="rId6"/>
+    <p:sldId id="262" r:id="rId7"/>
   </p:sldIdLst>
   <p:sldSz cx="12192000" cy="6858000"/>
   <p:notesSz cx="6858000" cy="9144000"/>
@@ -263,7 +264,7 @@
           <a:p>
             <a:fld id="{3DA55360-DDDC-4346-A6FA-426842ECECBE}" type="datetimeFigureOut">
               <a:rPr kumimoji="1" lang="zh-CN" altLang="en-US" smtClean="0"/>
-              <a:t>2024/2/13</a:t>
+              <a:t>2024/3/3</a:t>
             </a:fld>
             <a:endParaRPr kumimoji="1" lang="zh-CN" altLang="en-US"/>
           </a:p>
@@ -461,7 +462,7 @@
           <a:p>
             <a:fld id="{3DA55360-DDDC-4346-A6FA-426842ECECBE}" type="datetimeFigureOut">
               <a:rPr kumimoji="1" lang="zh-CN" altLang="en-US" smtClean="0"/>
-              <a:t>2024/2/13</a:t>
+              <a:t>2024/3/3</a:t>
             </a:fld>
             <a:endParaRPr kumimoji="1" lang="zh-CN" altLang="en-US"/>
           </a:p>
@@ -669,7 +670,7 @@
           <a:p>
             <a:fld id="{3DA55360-DDDC-4346-A6FA-426842ECECBE}" type="datetimeFigureOut">
               <a:rPr kumimoji="1" lang="zh-CN" altLang="en-US" smtClean="0"/>
-              <a:t>2024/2/13</a:t>
+              <a:t>2024/3/3</a:t>
             </a:fld>
             <a:endParaRPr kumimoji="1" lang="zh-CN" altLang="en-US"/>
           </a:p>
@@ -867,7 +868,7 @@
           <a:p>
             <a:fld id="{3DA55360-DDDC-4346-A6FA-426842ECECBE}" type="datetimeFigureOut">
               <a:rPr kumimoji="1" lang="zh-CN" altLang="en-US" smtClean="0"/>
-              <a:t>2024/2/13</a:t>
+              <a:t>2024/3/3</a:t>
             </a:fld>
             <a:endParaRPr kumimoji="1" lang="zh-CN" altLang="en-US"/>
           </a:p>
@@ -1142,7 +1143,7 @@
           <a:p>
             <a:fld id="{3DA55360-DDDC-4346-A6FA-426842ECECBE}" type="datetimeFigureOut">
               <a:rPr kumimoji="1" lang="zh-CN" altLang="en-US" smtClean="0"/>
-              <a:t>2024/2/13</a:t>
+              <a:t>2024/3/3</a:t>
             </a:fld>
             <a:endParaRPr kumimoji="1" lang="zh-CN" altLang="en-US"/>
           </a:p>
@@ -1407,7 +1408,7 @@
           <a:p>
             <a:fld id="{3DA55360-DDDC-4346-A6FA-426842ECECBE}" type="datetimeFigureOut">
               <a:rPr kumimoji="1" lang="zh-CN" altLang="en-US" smtClean="0"/>
-              <a:t>2024/2/13</a:t>
+              <a:t>2024/3/3</a:t>
             </a:fld>
             <a:endParaRPr kumimoji="1" lang="zh-CN" altLang="en-US"/>
           </a:p>
@@ -1819,7 +1820,7 @@
           <a:p>
             <a:fld id="{3DA55360-DDDC-4346-A6FA-426842ECECBE}" type="datetimeFigureOut">
               <a:rPr kumimoji="1" lang="zh-CN" altLang="en-US" smtClean="0"/>
-              <a:t>2024/2/13</a:t>
+              <a:t>2024/3/3</a:t>
             </a:fld>
             <a:endParaRPr kumimoji="1" lang="zh-CN" altLang="en-US"/>
           </a:p>
@@ -1960,7 +1961,7 @@
           <a:p>
             <a:fld id="{3DA55360-DDDC-4346-A6FA-426842ECECBE}" type="datetimeFigureOut">
               <a:rPr kumimoji="1" lang="zh-CN" altLang="en-US" smtClean="0"/>
-              <a:t>2024/2/13</a:t>
+              <a:t>2024/3/3</a:t>
             </a:fld>
             <a:endParaRPr kumimoji="1" lang="zh-CN" altLang="en-US"/>
           </a:p>
@@ -2073,7 +2074,7 @@
           <a:p>
             <a:fld id="{3DA55360-DDDC-4346-A6FA-426842ECECBE}" type="datetimeFigureOut">
               <a:rPr kumimoji="1" lang="zh-CN" altLang="en-US" smtClean="0"/>
-              <a:t>2024/2/13</a:t>
+              <a:t>2024/3/3</a:t>
             </a:fld>
             <a:endParaRPr kumimoji="1" lang="zh-CN" altLang="en-US"/>
           </a:p>
@@ -2384,7 +2385,7 @@
           <a:p>
             <a:fld id="{3DA55360-DDDC-4346-A6FA-426842ECECBE}" type="datetimeFigureOut">
               <a:rPr kumimoji="1" lang="zh-CN" altLang="en-US" smtClean="0"/>
-              <a:t>2024/2/13</a:t>
+              <a:t>2024/3/3</a:t>
             </a:fld>
             <a:endParaRPr kumimoji="1" lang="zh-CN" altLang="en-US"/>
           </a:p>
@@ -2672,7 +2673,7 @@
           <a:p>
             <a:fld id="{3DA55360-DDDC-4346-A6FA-426842ECECBE}" type="datetimeFigureOut">
               <a:rPr kumimoji="1" lang="zh-CN" altLang="en-US" smtClean="0"/>
-              <a:t>2024/2/13</a:t>
+              <a:t>2024/3/3</a:t>
             </a:fld>
             <a:endParaRPr kumimoji="1" lang="zh-CN" altLang="en-US"/>
           </a:p>
@@ -2913,7 +2914,7 @@
           <a:p>
             <a:fld id="{3DA55360-DDDC-4346-A6FA-426842ECECBE}" type="datetimeFigureOut">
               <a:rPr kumimoji="1" lang="zh-CN" altLang="en-US" smtClean="0"/>
-              <a:t>2024/2/13</a:t>
+              <a:t>2024/3/3</a:t>
             </a:fld>
             <a:endParaRPr kumimoji="1" lang="zh-CN" altLang="en-US"/>
           </a:p>
@@ -14655,6 +14656,1825 @@
 </p:sld>
 </file>
 
+<file path=ppt/slides/slide6.xml><?xml version="1.0" encoding="utf-8"?>
+<p:sld xmlns:a="http://schemas.openxmlformats.org/drawingml/2006/main" xmlns:r="http://schemas.openxmlformats.org/officeDocument/2006/relationships" xmlns:p="http://schemas.openxmlformats.org/presentationml/2006/main">
+  <p:cSld>
+    <p:spTree>
+      <p:nvGrpSpPr>
+        <p:cNvPr id="1" name=""/>
+        <p:cNvGrpSpPr/>
+        <p:nvPr/>
+      </p:nvGrpSpPr>
+      <p:grpSpPr>
+        <a:xfrm>
+          <a:off x="0" y="0"/>
+          <a:ext cx="0" cy="0"/>
+          <a:chOff x="0" y="0"/>
+          <a:chExt cx="0" cy="0"/>
+        </a:xfrm>
+      </p:grpSpPr>
+      <p:graphicFrame>
+        <p:nvGraphicFramePr>
+          <p:cNvPr id="2" name="Table 1">
+            <a:extLst>
+              <a:ext uri="{FF2B5EF4-FFF2-40B4-BE49-F238E27FC236}">
+                <a16:creationId xmlns:a16="http://schemas.microsoft.com/office/drawing/2014/main" id="{D25BBB04-1E65-B8BD-FC2B-28394D2FFCDB}"/>
+              </a:ext>
+            </a:extLst>
+          </p:cNvPr>
+          <p:cNvGraphicFramePr>
+            <a:graphicFrameLocks noGrp="1"/>
+          </p:cNvGraphicFramePr>
+          <p:nvPr>
+            <p:extLst>
+              <p:ext uri="{D42A27DB-BD31-4B8C-83A1-F6EECF244321}">
+                <p14:modId xmlns:p14="http://schemas.microsoft.com/office/powerpoint/2010/main" val="2664214462"/>
+              </p:ext>
+            </p:extLst>
+          </p:nvPr>
+        </p:nvGraphicFramePr>
+        <p:xfrm>
+          <a:off x="1842812" y="630620"/>
+          <a:ext cx="2484380" cy="3703320"/>
+        </p:xfrm>
+        <a:graphic>
+          <a:graphicData uri="http://schemas.openxmlformats.org/drawingml/2006/table">
+            <a:tbl>
+              <a:tblPr firstRow="1" bandRow="1">
+                <a:tableStyleId>{5C22544A-7EE6-4342-B048-85BDC9FD1C3A}</a:tableStyleId>
+              </a:tblPr>
+              <a:tblGrid>
+                <a:gridCol w="1325906">
+                  <a:extLst>
+                    <a:ext uri="{9D8B030D-6E8A-4147-A177-3AD203B41FA5}">
+                      <a16:colId xmlns:a16="http://schemas.microsoft.com/office/drawing/2014/main" val="2459382653"/>
+                    </a:ext>
+                  </a:extLst>
+                </a:gridCol>
+                <a:gridCol w="1158474">
+                  <a:extLst>
+                    <a:ext uri="{9D8B030D-6E8A-4147-A177-3AD203B41FA5}">
+                      <a16:colId xmlns:a16="http://schemas.microsoft.com/office/drawing/2014/main" val="4188676412"/>
+                    </a:ext>
+                  </a:extLst>
+                </a:gridCol>
+              </a:tblGrid>
+              <a:tr h="270699">
+                <a:tc>
+                  <a:txBody>
+                    <a:bodyPr/>
+                    <a:lstStyle/>
+                    <a:p>
+                      <a:pPr algn="ctr"/>
+                      <a:r>
+                        <a:rPr lang="en-CN" dirty="0"/>
+                        <a:t>ADDRESS</a:t>
+                      </a:r>
+                    </a:p>
+                  </a:txBody>
+                  <a:tcPr/>
+                </a:tc>
+                <a:tc>
+                  <a:txBody>
+                    <a:bodyPr/>
+                    <a:lstStyle/>
+                    <a:p>
+                      <a:pPr algn="ctr"/>
+                      <a:r>
+                        <a:rPr lang="en-CN" dirty="0"/>
+                        <a:t>DATA</a:t>
+                      </a:r>
+                    </a:p>
+                  </a:txBody>
+                  <a:tcPr/>
+                </a:tc>
+                <a:extLst>
+                  <a:ext uri="{0D108BD9-81ED-4DB2-BD59-A6C34878D82A}">
+                    <a16:rowId xmlns:a16="http://schemas.microsoft.com/office/drawing/2014/main" val="2396642285"/>
+                  </a:ext>
+                </a:extLst>
+              </a:tr>
+              <a:tr h="370840">
+                <a:tc>
+                  <a:txBody>
+                    <a:bodyPr/>
+                    <a:lstStyle/>
+                    <a:p>
+                      <a:pPr algn="ctr"/>
+                      <a:r>
+                        <a:rPr lang="en-US" altLang="zh-CN" dirty="0"/>
+                        <a:t>0x00</a:t>
+                      </a:r>
+                      <a:endParaRPr lang="en-CN" dirty="0"/>
+                    </a:p>
+                  </a:txBody>
+                  <a:tcPr/>
+                </a:tc>
+                <a:tc>
+                  <a:txBody>
+                    <a:bodyPr/>
+                    <a:lstStyle/>
+                    <a:p>
+                      <a:pPr algn="ctr"/>
+                      <a:r>
+                        <a:rPr lang="en-US" altLang="zh-CN" dirty="0">
+                          <a:solidFill>
+                            <a:srgbClr val="FF0000"/>
+                          </a:solidFill>
+                        </a:rPr>
+                        <a:t>0x01</a:t>
+                      </a:r>
+                      <a:endParaRPr lang="en-CN" dirty="0">
+                        <a:solidFill>
+                          <a:srgbClr val="FF0000"/>
+                        </a:solidFill>
+                      </a:endParaRPr>
+                    </a:p>
+                  </a:txBody>
+                  <a:tcPr/>
+                </a:tc>
+                <a:extLst>
+                  <a:ext uri="{0D108BD9-81ED-4DB2-BD59-A6C34878D82A}">
+                    <a16:rowId xmlns:a16="http://schemas.microsoft.com/office/drawing/2014/main" val="751872452"/>
+                  </a:ext>
+                </a:extLst>
+              </a:tr>
+              <a:tr h="370840">
+                <a:tc>
+                  <a:txBody>
+                    <a:bodyPr/>
+                    <a:lstStyle/>
+                    <a:p>
+                      <a:pPr algn="ctr"/>
+                      <a:r>
+                        <a:rPr lang="en-US" altLang="zh-CN" dirty="0"/>
+                        <a:t>0x01</a:t>
+                      </a:r>
+                      <a:endParaRPr lang="en-CN" dirty="0"/>
+                    </a:p>
+                  </a:txBody>
+                  <a:tcPr/>
+                </a:tc>
+                <a:tc>
+                  <a:txBody>
+                    <a:bodyPr/>
+                    <a:lstStyle/>
+                    <a:p>
+                      <a:pPr algn="ctr"/>
+                      <a:r>
+                        <a:rPr lang="en-US" dirty="0"/>
+                        <a:t>0x02</a:t>
+                      </a:r>
+                      <a:endParaRPr lang="en-CN" dirty="0"/>
+                    </a:p>
+                  </a:txBody>
+                  <a:tcPr/>
+                </a:tc>
+                <a:extLst>
+                  <a:ext uri="{0D108BD9-81ED-4DB2-BD59-A6C34878D82A}">
+                    <a16:rowId xmlns:a16="http://schemas.microsoft.com/office/drawing/2014/main" val="3503078896"/>
+                  </a:ext>
+                </a:extLst>
+              </a:tr>
+              <a:tr h="370840">
+                <a:tc>
+                  <a:txBody>
+                    <a:bodyPr/>
+                    <a:lstStyle/>
+                    <a:p>
+                      <a:pPr algn="ctr"/>
+                      <a:r>
+                        <a:rPr lang="en-US" altLang="zh-CN" dirty="0"/>
+                        <a:t>0x</a:t>
+                      </a:r>
+                      <a:r>
+                        <a:rPr lang="en-CN" dirty="0"/>
+                        <a:t>02</a:t>
+                      </a:r>
+                    </a:p>
+                  </a:txBody>
+                  <a:tcPr/>
+                </a:tc>
+                <a:tc>
+                  <a:txBody>
+                    <a:bodyPr/>
+                    <a:lstStyle/>
+                    <a:p>
+                      <a:pPr marL="0" marR="0" lvl="0" indent="0" algn="ctr" defTabSz="914400" rtl="0" eaLnBrk="1" fontAlgn="auto" latinLnBrk="0" hangingPunct="1">
+                        <a:lnSpc>
+                          <a:spcPct val="100000"/>
+                        </a:lnSpc>
+                        <a:spcBef>
+                          <a:spcPts val="0"/>
+                        </a:spcBef>
+                        <a:spcAft>
+                          <a:spcPts val="0"/>
+                        </a:spcAft>
+                        <a:buClrTx/>
+                        <a:buSzTx/>
+                        <a:buFontTx/>
+                        <a:buNone/>
+                        <a:tabLst/>
+                        <a:defRPr/>
+                      </a:pPr>
+                      <a:r>
+                        <a:rPr lang="en-US" dirty="0"/>
+                        <a:t>0x06</a:t>
+                      </a:r>
+                      <a:endParaRPr lang="en-CN" dirty="0"/>
+                    </a:p>
+                  </a:txBody>
+                  <a:tcPr/>
+                </a:tc>
+                <a:extLst>
+                  <a:ext uri="{0D108BD9-81ED-4DB2-BD59-A6C34878D82A}">
+                    <a16:rowId xmlns:a16="http://schemas.microsoft.com/office/drawing/2014/main" val="1586949569"/>
+                  </a:ext>
+                </a:extLst>
+              </a:tr>
+              <a:tr h="370840">
+                <a:tc>
+                  <a:txBody>
+                    <a:bodyPr/>
+                    <a:lstStyle/>
+                    <a:p>
+                      <a:pPr algn="ctr"/>
+                      <a:r>
+                        <a:rPr lang="en-US" altLang="zh-CN" dirty="0"/>
+                        <a:t>0x</a:t>
+                      </a:r>
+                      <a:r>
+                        <a:rPr lang="en-CN" dirty="0"/>
+                        <a:t>03</a:t>
+                      </a:r>
+                    </a:p>
+                  </a:txBody>
+                  <a:tcPr/>
+                </a:tc>
+                <a:tc>
+                  <a:txBody>
+                    <a:bodyPr/>
+                    <a:lstStyle/>
+                    <a:p>
+                      <a:pPr marL="0" marR="0" lvl="0" indent="0" algn="ctr" defTabSz="914400" rtl="0" eaLnBrk="1" fontAlgn="auto" latinLnBrk="0" hangingPunct="1">
+                        <a:lnSpc>
+                          <a:spcPct val="100000"/>
+                        </a:lnSpc>
+                        <a:spcBef>
+                          <a:spcPts val="0"/>
+                        </a:spcBef>
+                        <a:spcAft>
+                          <a:spcPts val="0"/>
+                        </a:spcAft>
+                        <a:buClrTx/>
+                        <a:buSzTx/>
+                        <a:buFontTx/>
+                        <a:buNone/>
+                        <a:tabLst/>
+                        <a:defRPr/>
+                      </a:pPr>
+                      <a:r>
+                        <a:rPr lang="en-US" dirty="0">
+                          <a:solidFill>
+                            <a:srgbClr val="FFC000"/>
+                          </a:solidFill>
+                        </a:rPr>
+                        <a:t>0x08</a:t>
+                      </a:r>
+                      <a:endParaRPr lang="en-CN" dirty="0">
+                        <a:solidFill>
+                          <a:srgbClr val="FFC000"/>
+                        </a:solidFill>
+                      </a:endParaRPr>
+                    </a:p>
+                  </a:txBody>
+                  <a:tcPr/>
+                </a:tc>
+                <a:extLst>
+                  <a:ext uri="{0D108BD9-81ED-4DB2-BD59-A6C34878D82A}">
+                    <a16:rowId xmlns:a16="http://schemas.microsoft.com/office/drawing/2014/main" val="3829265347"/>
+                  </a:ext>
+                </a:extLst>
+              </a:tr>
+              <a:tr h="370840">
+                <a:tc>
+                  <a:txBody>
+                    <a:bodyPr/>
+                    <a:lstStyle/>
+                    <a:p>
+                      <a:pPr algn="ctr"/>
+                      <a:r>
+                        <a:rPr lang="en-US" altLang="zh-CN" dirty="0"/>
+                        <a:t>0x</a:t>
+                      </a:r>
+                      <a:r>
+                        <a:rPr lang="en-CN" altLang="zh-CN" dirty="0"/>
+                        <a:t>04</a:t>
+                      </a:r>
+                      <a:endParaRPr lang="en-CN" dirty="0"/>
+                    </a:p>
+                  </a:txBody>
+                  <a:tcPr/>
+                </a:tc>
+                <a:tc>
+                  <a:txBody>
+                    <a:bodyPr/>
+                    <a:lstStyle/>
+                    <a:p>
+                      <a:pPr algn="ctr"/>
+                      <a:r>
+                        <a:rPr lang="en-US" altLang="zh-CN" dirty="0">
+                          <a:solidFill>
+                            <a:srgbClr val="FF0000"/>
+                          </a:solidFill>
+                        </a:rPr>
+                        <a:t>0x01</a:t>
+                      </a:r>
+                      <a:endParaRPr lang="en-CN" dirty="0">
+                        <a:solidFill>
+                          <a:srgbClr val="FF0000"/>
+                        </a:solidFill>
+                      </a:endParaRPr>
+                    </a:p>
+                  </a:txBody>
+                  <a:tcPr/>
+                </a:tc>
+                <a:extLst>
+                  <a:ext uri="{0D108BD9-81ED-4DB2-BD59-A6C34878D82A}">
+                    <a16:rowId xmlns:a16="http://schemas.microsoft.com/office/drawing/2014/main" val="3701478012"/>
+                  </a:ext>
+                </a:extLst>
+              </a:tr>
+              <a:tr h="370840">
+                <a:tc>
+                  <a:txBody>
+                    <a:bodyPr/>
+                    <a:lstStyle/>
+                    <a:p>
+                      <a:pPr algn="ctr"/>
+                      <a:r>
+                        <a:rPr lang="en-US" altLang="zh-CN" dirty="0"/>
+                        <a:t>0x</a:t>
+                      </a:r>
+                      <a:r>
+                        <a:rPr lang="en-CN" altLang="zh-CN" dirty="0"/>
+                        <a:t>05</a:t>
+                      </a:r>
+                      <a:endParaRPr lang="en-CN" dirty="0"/>
+                    </a:p>
+                  </a:txBody>
+                  <a:tcPr/>
+                </a:tc>
+                <a:tc>
+                  <a:txBody>
+                    <a:bodyPr/>
+                    <a:lstStyle/>
+                    <a:p>
+                      <a:pPr marL="0" marR="0" lvl="0" indent="0" algn="ctr" defTabSz="914400" rtl="0" eaLnBrk="1" fontAlgn="auto" latinLnBrk="0" hangingPunct="1">
+                        <a:lnSpc>
+                          <a:spcPct val="100000"/>
+                        </a:lnSpc>
+                        <a:spcBef>
+                          <a:spcPts val="0"/>
+                        </a:spcBef>
+                        <a:spcAft>
+                          <a:spcPts val="0"/>
+                        </a:spcAft>
+                        <a:buClrTx/>
+                        <a:buSzTx/>
+                        <a:buFontTx/>
+                        <a:buNone/>
+                        <a:tabLst/>
+                        <a:defRPr/>
+                      </a:pPr>
+                      <a:r>
+                        <a:rPr lang="en-US" dirty="0"/>
+                        <a:t>0x00</a:t>
+                      </a:r>
+                      <a:endParaRPr lang="en-CN" dirty="0"/>
+                    </a:p>
+                  </a:txBody>
+                  <a:tcPr/>
+                </a:tc>
+                <a:extLst>
+                  <a:ext uri="{0D108BD9-81ED-4DB2-BD59-A6C34878D82A}">
+                    <a16:rowId xmlns:a16="http://schemas.microsoft.com/office/drawing/2014/main" val="3505889409"/>
+                  </a:ext>
+                </a:extLst>
+              </a:tr>
+              <a:tr h="370840">
+                <a:tc>
+                  <a:txBody>
+                    <a:bodyPr/>
+                    <a:lstStyle/>
+                    <a:p>
+                      <a:pPr algn="ctr"/>
+                      <a:r>
+                        <a:rPr lang="en-US" altLang="zh-CN" dirty="0"/>
+                        <a:t>0x</a:t>
+                      </a:r>
+                      <a:r>
+                        <a:rPr lang="en-CN" altLang="zh-CN" dirty="0"/>
+                        <a:t>06</a:t>
+                      </a:r>
+                      <a:endParaRPr lang="en-CN" dirty="0"/>
+                    </a:p>
+                  </a:txBody>
+                  <a:tcPr/>
+                </a:tc>
+                <a:tc>
+                  <a:txBody>
+                    <a:bodyPr/>
+                    <a:lstStyle/>
+                    <a:p>
+                      <a:pPr marL="0" marR="0" lvl="0" indent="0" algn="ctr" defTabSz="914400" rtl="0" eaLnBrk="1" fontAlgn="auto" latinLnBrk="0" hangingPunct="1">
+                        <a:lnSpc>
+                          <a:spcPct val="100000"/>
+                        </a:lnSpc>
+                        <a:spcBef>
+                          <a:spcPts val="0"/>
+                        </a:spcBef>
+                        <a:spcAft>
+                          <a:spcPts val="0"/>
+                        </a:spcAft>
+                        <a:buClrTx/>
+                        <a:buSzTx/>
+                        <a:buFontTx/>
+                        <a:buNone/>
+                        <a:tabLst/>
+                        <a:defRPr/>
+                      </a:pPr>
+                      <a:r>
+                        <a:rPr lang="en-US" dirty="0"/>
+                        <a:t>0x00</a:t>
+                      </a:r>
+                      <a:endParaRPr lang="en-CN" dirty="0"/>
+                    </a:p>
+                  </a:txBody>
+                  <a:tcPr/>
+                </a:tc>
+                <a:extLst>
+                  <a:ext uri="{0D108BD9-81ED-4DB2-BD59-A6C34878D82A}">
+                    <a16:rowId xmlns:a16="http://schemas.microsoft.com/office/drawing/2014/main" val="2334802600"/>
+                  </a:ext>
+                </a:extLst>
+              </a:tr>
+              <a:tr h="370840">
+                <a:tc>
+                  <a:txBody>
+                    <a:bodyPr/>
+                    <a:lstStyle/>
+                    <a:p>
+                      <a:pPr algn="ctr"/>
+                      <a:r>
+                        <a:rPr lang="en-US" altLang="zh-CN" dirty="0"/>
+                        <a:t>0x</a:t>
+                      </a:r>
+                      <a:r>
+                        <a:rPr lang="en-CN" altLang="zh-CN" dirty="0"/>
+                        <a:t>07</a:t>
+                      </a:r>
+                      <a:endParaRPr lang="en-CN" dirty="0"/>
+                    </a:p>
+                  </a:txBody>
+                  <a:tcPr/>
+                </a:tc>
+                <a:tc>
+                  <a:txBody>
+                    <a:bodyPr/>
+                    <a:lstStyle/>
+                    <a:p>
+                      <a:pPr marL="0" marR="0" lvl="0" indent="0" algn="ctr" defTabSz="914400" rtl="0" eaLnBrk="1" fontAlgn="auto" latinLnBrk="0" hangingPunct="1">
+                        <a:lnSpc>
+                          <a:spcPct val="100000"/>
+                        </a:lnSpc>
+                        <a:spcBef>
+                          <a:spcPts val="0"/>
+                        </a:spcBef>
+                        <a:spcAft>
+                          <a:spcPts val="0"/>
+                        </a:spcAft>
+                        <a:buClrTx/>
+                        <a:buSzTx/>
+                        <a:buFontTx/>
+                        <a:buNone/>
+                        <a:tabLst/>
+                        <a:defRPr/>
+                      </a:pPr>
+                      <a:r>
+                        <a:rPr lang="en-US" dirty="0">
+                          <a:solidFill>
+                            <a:srgbClr val="FFC000"/>
+                          </a:solidFill>
+                        </a:rPr>
+                        <a:t>0x00</a:t>
+                      </a:r>
+                      <a:endParaRPr lang="en-CN" dirty="0">
+                        <a:solidFill>
+                          <a:srgbClr val="FFC000"/>
+                        </a:solidFill>
+                      </a:endParaRPr>
+                    </a:p>
+                  </a:txBody>
+                  <a:tcPr/>
+                </a:tc>
+                <a:extLst>
+                  <a:ext uri="{0D108BD9-81ED-4DB2-BD59-A6C34878D82A}">
+                    <a16:rowId xmlns:a16="http://schemas.microsoft.com/office/drawing/2014/main" val="3263919875"/>
+                  </a:ext>
+                </a:extLst>
+              </a:tr>
+              <a:tr h="370840">
+                <a:tc>
+                  <a:txBody>
+                    <a:bodyPr/>
+                    <a:lstStyle/>
+                    <a:p>
+                      <a:pPr algn="ctr"/>
+                      <a:r>
+                        <a:rPr lang="en-CN" dirty="0"/>
+                        <a:t>…</a:t>
+                      </a:r>
+                    </a:p>
+                  </a:txBody>
+                  <a:tcPr/>
+                </a:tc>
+                <a:tc>
+                  <a:txBody>
+                    <a:bodyPr/>
+                    <a:lstStyle/>
+                    <a:p>
+                      <a:pPr algn="ctr"/>
+                      <a:r>
+                        <a:rPr lang="en-CN" dirty="0"/>
+                        <a:t>…</a:t>
+                      </a:r>
+                    </a:p>
+                  </a:txBody>
+                  <a:tcPr/>
+                </a:tc>
+                <a:extLst>
+                  <a:ext uri="{0D108BD9-81ED-4DB2-BD59-A6C34878D82A}">
+                    <a16:rowId xmlns:a16="http://schemas.microsoft.com/office/drawing/2014/main" val="3544819921"/>
+                  </a:ext>
+                </a:extLst>
+              </a:tr>
+            </a:tbl>
+          </a:graphicData>
+        </a:graphic>
+      </p:graphicFrame>
+      <p:sp>
+        <p:nvSpPr>
+          <p:cNvPr id="4" name="Right Brace 3">
+            <a:extLst>
+              <a:ext uri="{FF2B5EF4-FFF2-40B4-BE49-F238E27FC236}">
+                <a16:creationId xmlns:a16="http://schemas.microsoft.com/office/drawing/2014/main" id="{396FA7D0-A59C-D344-D1CD-5FB2F9BE684D}"/>
+              </a:ext>
+            </a:extLst>
+          </p:cNvPr>
+          <p:cNvSpPr/>
+          <p:nvPr/>
+        </p:nvSpPr>
+        <p:spPr>
+          <a:xfrm>
+            <a:off x="4421275" y="1034980"/>
+            <a:ext cx="341644" cy="1376624"/>
+          </a:xfrm>
+          <a:prstGeom prst="rightBrace">
+            <a:avLst/>
+          </a:prstGeom>
+          <a:ln w="12700"/>
+        </p:spPr>
+        <p:style>
+          <a:lnRef idx="1">
+            <a:schemeClr val="accent1"/>
+          </a:lnRef>
+          <a:fillRef idx="0">
+            <a:schemeClr val="accent1"/>
+          </a:fillRef>
+          <a:effectRef idx="0">
+            <a:schemeClr val="accent1"/>
+          </a:effectRef>
+          <a:fontRef idx="minor">
+            <a:schemeClr val="tx1"/>
+          </a:fontRef>
+        </p:style>
+        <p:txBody>
+          <a:bodyPr rtlCol="0" anchor="ctr"/>
+          <a:lstStyle/>
+          <a:p>
+            <a:pPr algn="ctr"/>
+            <a:endParaRPr lang="en-CN" dirty="0">
+              <a:ln w="76200">
+                <a:solidFill>
+                  <a:schemeClr val="tx1"/>
+                </a:solidFill>
+              </a:ln>
+              <a:solidFill>
+                <a:sysClr val="windowText" lastClr="000000"/>
+              </a:solidFill>
+            </a:endParaRPr>
+          </a:p>
+        </p:txBody>
+      </p:sp>
+      <p:sp>
+        <p:nvSpPr>
+          <p:cNvPr id="5" name="Right Brace 4">
+            <a:extLst>
+              <a:ext uri="{FF2B5EF4-FFF2-40B4-BE49-F238E27FC236}">
+                <a16:creationId xmlns:a16="http://schemas.microsoft.com/office/drawing/2014/main" id="{0FFDF9BF-95E3-1C09-C579-92EFE28E972F}"/>
+              </a:ext>
+            </a:extLst>
+          </p:cNvPr>
+          <p:cNvSpPr/>
+          <p:nvPr/>
+        </p:nvSpPr>
+        <p:spPr>
+          <a:xfrm>
+            <a:off x="4421275" y="2572716"/>
+            <a:ext cx="341644" cy="1376624"/>
+          </a:xfrm>
+          <a:prstGeom prst="rightBrace">
+            <a:avLst/>
+          </a:prstGeom>
+          <a:ln w="12700"/>
+        </p:spPr>
+        <p:style>
+          <a:lnRef idx="1">
+            <a:schemeClr val="accent1"/>
+          </a:lnRef>
+          <a:fillRef idx="0">
+            <a:schemeClr val="accent1"/>
+          </a:fillRef>
+          <a:effectRef idx="0">
+            <a:schemeClr val="accent1"/>
+          </a:effectRef>
+          <a:fontRef idx="minor">
+            <a:schemeClr val="tx1"/>
+          </a:fontRef>
+        </p:style>
+        <p:txBody>
+          <a:bodyPr rtlCol="0" anchor="ctr"/>
+          <a:lstStyle/>
+          <a:p>
+            <a:pPr algn="ctr"/>
+            <a:endParaRPr lang="en-CN" dirty="0">
+              <a:ln w="76200">
+                <a:solidFill>
+                  <a:schemeClr val="tx1"/>
+                </a:solidFill>
+              </a:ln>
+              <a:solidFill>
+                <a:sysClr val="windowText" lastClr="000000"/>
+              </a:solidFill>
+            </a:endParaRPr>
+          </a:p>
+        </p:txBody>
+      </p:sp>
+      <p:sp>
+        <p:nvSpPr>
+          <p:cNvPr id="6" name="Rectangle 5">
+            <a:extLst>
+              <a:ext uri="{FF2B5EF4-FFF2-40B4-BE49-F238E27FC236}">
+                <a16:creationId xmlns:a16="http://schemas.microsoft.com/office/drawing/2014/main" id="{59C6D7BD-3DBB-FD3A-1D32-B0258B302B12}"/>
+              </a:ext>
+            </a:extLst>
+          </p:cNvPr>
+          <p:cNvSpPr/>
+          <p:nvPr/>
+        </p:nvSpPr>
+        <p:spPr>
+          <a:xfrm>
+            <a:off x="5245240" y="1215852"/>
+            <a:ext cx="1245995" cy="351693"/>
+          </a:xfrm>
+          <a:prstGeom prst="rect">
+            <a:avLst/>
+          </a:prstGeom>
+        </p:spPr>
+        <p:style>
+          <a:lnRef idx="2">
+            <a:schemeClr val="accent5"/>
+          </a:lnRef>
+          <a:fillRef idx="1">
+            <a:schemeClr val="lt1"/>
+          </a:fillRef>
+          <a:effectRef idx="0">
+            <a:schemeClr val="accent5"/>
+          </a:effectRef>
+          <a:fontRef idx="minor">
+            <a:schemeClr val="dk1"/>
+          </a:fontRef>
+        </p:style>
+        <p:txBody>
+          <a:bodyPr rtlCol="0" anchor="ctr"/>
+          <a:lstStyle/>
+          <a:p>
+            <a:pPr algn="ctr"/>
+            <a:r>
+              <a:rPr lang="en-CN" dirty="0">
+                <a:solidFill>
+                  <a:srgbClr val="FFC000"/>
+                </a:solidFill>
+              </a:rPr>
+              <a:t>00001000</a:t>
+            </a:r>
+          </a:p>
+        </p:txBody>
+      </p:sp>
+      <p:sp>
+        <p:nvSpPr>
+          <p:cNvPr id="7" name="Rectangle 6">
+            <a:extLst>
+              <a:ext uri="{FF2B5EF4-FFF2-40B4-BE49-F238E27FC236}">
+                <a16:creationId xmlns:a16="http://schemas.microsoft.com/office/drawing/2014/main" id="{3E30B29C-95A8-6A02-7198-268C6D914686}"/>
+              </a:ext>
+            </a:extLst>
+          </p:cNvPr>
+          <p:cNvSpPr/>
+          <p:nvPr/>
+        </p:nvSpPr>
+        <p:spPr>
+          <a:xfrm>
+            <a:off x="6491235" y="1215852"/>
+            <a:ext cx="1245995" cy="351693"/>
+          </a:xfrm>
+          <a:prstGeom prst="rect">
+            <a:avLst/>
+          </a:prstGeom>
+        </p:spPr>
+        <p:style>
+          <a:lnRef idx="2">
+            <a:schemeClr val="accent5"/>
+          </a:lnRef>
+          <a:fillRef idx="1">
+            <a:schemeClr val="lt1"/>
+          </a:fillRef>
+          <a:effectRef idx="0">
+            <a:schemeClr val="accent5"/>
+          </a:effectRef>
+          <a:fontRef idx="minor">
+            <a:schemeClr val="dk1"/>
+          </a:fontRef>
+        </p:style>
+        <p:txBody>
+          <a:bodyPr rtlCol="0" anchor="ctr"/>
+          <a:lstStyle/>
+          <a:p>
+            <a:pPr algn="ctr"/>
+            <a:r>
+              <a:rPr lang="en-CN" dirty="0"/>
+              <a:t>00000110</a:t>
+            </a:r>
+          </a:p>
+        </p:txBody>
+      </p:sp>
+      <p:sp>
+        <p:nvSpPr>
+          <p:cNvPr id="8" name="Rectangle 7">
+            <a:extLst>
+              <a:ext uri="{FF2B5EF4-FFF2-40B4-BE49-F238E27FC236}">
+                <a16:creationId xmlns:a16="http://schemas.microsoft.com/office/drawing/2014/main" id="{10E43B65-5134-1D47-1711-A07F9C08705A}"/>
+              </a:ext>
+            </a:extLst>
+          </p:cNvPr>
+          <p:cNvSpPr/>
+          <p:nvPr/>
+        </p:nvSpPr>
+        <p:spPr>
+          <a:xfrm>
+            <a:off x="7737230" y="1215851"/>
+            <a:ext cx="1245995" cy="351693"/>
+          </a:xfrm>
+          <a:prstGeom prst="rect">
+            <a:avLst/>
+          </a:prstGeom>
+        </p:spPr>
+        <p:style>
+          <a:lnRef idx="2">
+            <a:schemeClr val="accent5"/>
+          </a:lnRef>
+          <a:fillRef idx="1">
+            <a:schemeClr val="lt1"/>
+          </a:fillRef>
+          <a:effectRef idx="0">
+            <a:schemeClr val="accent5"/>
+          </a:effectRef>
+          <a:fontRef idx="minor">
+            <a:schemeClr val="dk1"/>
+          </a:fontRef>
+        </p:style>
+        <p:txBody>
+          <a:bodyPr rtlCol="0" anchor="ctr"/>
+          <a:lstStyle/>
+          <a:p>
+            <a:pPr algn="ctr"/>
+            <a:r>
+              <a:rPr lang="en-CN" dirty="0"/>
+              <a:t>00000010</a:t>
+            </a:r>
+          </a:p>
+        </p:txBody>
+      </p:sp>
+      <p:sp>
+        <p:nvSpPr>
+          <p:cNvPr id="9" name="Rectangle 8">
+            <a:extLst>
+              <a:ext uri="{FF2B5EF4-FFF2-40B4-BE49-F238E27FC236}">
+                <a16:creationId xmlns:a16="http://schemas.microsoft.com/office/drawing/2014/main" id="{553706DC-DDDB-18CC-68B1-FF57309EEA65}"/>
+              </a:ext>
+            </a:extLst>
+          </p:cNvPr>
+          <p:cNvSpPr/>
+          <p:nvPr/>
+        </p:nvSpPr>
+        <p:spPr>
+          <a:xfrm>
+            <a:off x="8983225" y="1215850"/>
+            <a:ext cx="1245995" cy="351693"/>
+          </a:xfrm>
+          <a:prstGeom prst="rect">
+            <a:avLst/>
+          </a:prstGeom>
+        </p:spPr>
+        <p:style>
+          <a:lnRef idx="2">
+            <a:schemeClr val="accent5"/>
+          </a:lnRef>
+          <a:fillRef idx="1">
+            <a:schemeClr val="lt1"/>
+          </a:fillRef>
+          <a:effectRef idx="0">
+            <a:schemeClr val="accent5"/>
+          </a:effectRef>
+          <a:fontRef idx="minor">
+            <a:schemeClr val="dk1"/>
+          </a:fontRef>
+        </p:style>
+        <p:txBody>
+          <a:bodyPr rtlCol="0" anchor="ctr"/>
+          <a:lstStyle/>
+          <a:p>
+            <a:pPr algn="ctr"/>
+            <a:r>
+              <a:rPr lang="en-CN" dirty="0">
+                <a:solidFill>
+                  <a:srgbClr val="FF0000"/>
+                </a:solidFill>
+              </a:rPr>
+              <a:t>00000001</a:t>
+            </a:r>
+          </a:p>
+        </p:txBody>
+      </p:sp>
+      <p:sp>
+        <p:nvSpPr>
+          <p:cNvPr id="10" name="TextBox 9">
+            <a:extLst>
+              <a:ext uri="{FF2B5EF4-FFF2-40B4-BE49-F238E27FC236}">
+                <a16:creationId xmlns:a16="http://schemas.microsoft.com/office/drawing/2014/main" id="{3E928B10-B552-7C4A-D946-643202D2689A}"/>
+              </a:ext>
+            </a:extLst>
+          </p:cNvPr>
+          <p:cNvSpPr txBox="1"/>
+          <p:nvPr/>
+        </p:nvSpPr>
+        <p:spPr>
+          <a:xfrm>
+            <a:off x="5524769" y="856563"/>
+            <a:ext cx="686936" cy="369332"/>
+          </a:xfrm>
+          <a:prstGeom prst="rect">
+            <a:avLst/>
+          </a:prstGeom>
+          <a:noFill/>
+        </p:spPr>
+        <p:txBody>
+          <a:bodyPr wrap="square" rtlCol="0">
+            <a:spAutoFit/>
+          </a:bodyPr>
+          <a:lstStyle/>
+          <a:p>
+            <a:r>
+              <a:rPr lang="en-CN" dirty="0">
+                <a:ln w="0"/>
+                <a:solidFill>
+                  <a:schemeClr val="accent1"/>
+                </a:solidFill>
+                <a:effectLst>
+                  <a:outerShdw blurRad="38100" dist="25400" dir="5400000" algn="ctr" rotWithShape="0">
+                    <a:srgbClr val="6E747A">
+                      <a:alpha val="43000"/>
+                    </a:srgbClr>
+                  </a:outerShdw>
+                </a:effectLst>
+              </a:rPr>
+              <a:t>[000]</a:t>
+            </a:r>
+          </a:p>
+        </p:txBody>
+      </p:sp>
+      <p:sp>
+        <p:nvSpPr>
+          <p:cNvPr id="11" name="TextBox 10">
+            <a:extLst>
+              <a:ext uri="{FF2B5EF4-FFF2-40B4-BE49-F238E27FC236}">
+                <a16:creationId xmlns:a16="http://schemas.microsoft.com/office/drawing/2014/main" id="{25DAACA8-6DDD-B205-DCE1-72E6CA6E4C50}"/>
+              </a:ext>
+            </a:extLst>
+          </p:cNvPr>
+          <p:cNvSpPr txBox="1"/>
+          <p:nvPr/>
+        </p:nvSpPr>
+        <p:spPr>
+          <a:xfrm>
+            <a:off x="6770764" y="856563"/>
+            <a:ext cx="686936" cy="369332"/>
+          </a:xfrm>
+          <a:prstGeom prst="rect">
+            <a:avLst/>
+          </a:prstGeom>
+          <a:noFill/>
+        </p:spPr>
+        <p:txBody>
+          <a:bodyPr wrap="square" rtlCol="0">
+            <a:spAutoFit/>
+          </a:bodyPr>
+          <a:lstStyle/>
+          <a:p>
+            <a:r>
+              <a:rPr lang="en-CN" dirty="0">
+                <a:ln w="0"/>
+                <a:solidFill>
+                  <a:schemeClr val="accent1"/>
+                </a:solidFill>
+                <a:effectLst>
+                  <a:outerShdw blurRad="38100" dist="25400" dir="5400000" algn="ctr" rotWithShape="0">
+                    <a:srgbClr val="6E747A">
+                      <a:alpha val="43000"/>
+                    </a:srgbClr>
+                  </a:outerShdw>
+                </a:effectLst>
+              </a:rPr>
+              <a:t>[001]</a:t>
+            </a:r>
+          </a:p>
+        </p:txBody>
+      </p:sp>
+      <p:sp>
+        <p:nvSpPr>
+          <p:cNvPr id="12" name="TextBox 11">
+            <a:extLst>
+              <a:ext uri="{FF2B5EF4-FFF2-40B4-BE49-F238E27FC236}">
+                <a16:creationId xmlns:a16="http://schemas.microsoft.com/office/drawing/2014/main" id="{22911C81-90D8-2CF7-1C17-BE102EA05B36}"/>
+              </a:ext>
+            </a:extLst>
+          </p:cNvPr>
+          <p:cNvSpPr txBox="1"/>
+          <p:nvPr/>
+        </p:nvSpPr>
+        <p:spPr>
+          <a:xfrm>
+            <a:off x="8016759" y="856563"/>
+            <a:ext cx="686936" cy="369332"/>
+          </a:xfrm>
+          <a:prstGeom prst="rect">
+            <a:avLst/>
+          </a:prstGeom>
+          <a:noFill/>
+        </p:spPr>
+        <p:txBody>
+          <a:bodyPr wrap="square" rtlCol="0">
+            <a:spAutoFit/>
+          </a:bodyPr>
+          <a:lstStyle/>
+          <a:p>
+            <a:r>
+              <a:rPr lang="en-CN" dirty="0">
+                <a:ln w="0"/>
+                <a:solidFill>
+                  <a:schemeClr val="accent1"/>
+                </a:solidFill>
+                <a:effectLst>
+                  <a:outerShdw blurRad="38100" dist="25400" dir="5400000" algn="ctr" rotWithShape="0">
+                    <a:srgbClr val="6E747A">
+                      <a:alpha val="43000"/>
+                    </a:srgbClr>
+                  </a:outerShdw>
+                </a:effectLst>
+              </a:rPr>
+              <a:t>[010]</a:t>
+            </a:r>
+          </a:p>
+        </p:txBody>
+      </p:sp>
+      <p:sp>
+        <p:nvSpPr>
+          <p:cNvPr id="13" name="TextBox 12">
+            <a:extLst>
+              <a:ext uri="{FF2B5EF4-FFF2-40B4-BE49-F238E27FC236}">
+                <a16:creationId xmlns:a16="http://schemas.microsoft.com/office/drawing/2014/main" id="{CB224847-EAEB-E79C-050E-281A6C00E370}"/>
+              </a:ext>
+            </a:extLst>
+          </p:cNvPr>
+          <p:cNvSpPr txBox="1"/>
+          <p:nvPr/>
+        </p:nvSpPr>
+        <p:spPr>
+          <a:xfrm>
+            <a:off x="9262754" y="846517"/>
+            <a:ext cx="686936" cy="369332"/>
+          </a:xfrm>
+          <a:prstGeom prst="rect">
+            <a:avLst/>
+          </a:prstGeom>
+          <a:noFill/>
+        </p:spPr>
+        <p:txBody>
+          <a:bodyPr wrap="square" rtlCol="0">
+            <a:spAutoFit/>
+          </a:bodyPr>
+          <a:lstStyle/>
+          <a:p>
+            <a:r>
+              <a:rPr lang="en-CN" dirty="0">
+                <a:ln w="0"/>
+                <a:solidFill>
+                  <a:schemeClr val="accent1"/>
+                </a:solidFill>
+                <a:effectLst>
+                  <a:outerShdw blurRad="38100" dist="25400" dir="5400000" algn="ctr" rotWithShape="0">
+                    <a:srgbClr val="6E747A">
+                      <a:alpha val="43000"/>
+                    </a:srgbClr>
+                  </a:outerShdw>
+                </a:effectLst>
+              </a:rPr>
+              <a:t>[011]</a:t>
+            </a:r>
+          </a:p>
+        </p:txBody>
+      </p:sp>
+      <p:sp>
+        <p:nvSpPr>
+          <p:cNvPr id="14" name="Down Arrow 13">
+            <a:extLst>
+              <a:ext uri="{FF2B5EF4-FFF2-40B4-BE49-F238E27FC236}">
+                <a16:creationId xmlns:a16="http://schemas.microsoft.com/office/drawing/2014/main" id="{226A20E8-118B-9FDF-48B4-60B2B13B6775}"/>
+              </a:ext>
+            </a:extLst>
+          </p:cNvPr>
+          <p:cNvSpPr/>
+          <p:nvPr/>
+        </p:nvSpPr>
+        <p:spPr>
+          <a:xfrm>
+            <a:off x="7416594" y="1673052"/>
+            <a:ext cx="641271" cy="286378"/>
+          </a:xfrm>
+          <a:prstGeom prst="downArrow">
+            <a:avLst/>
+          </a:prstGeom>
+        </p:spPr>
+        <p:style>
+          <a:lnRef idx="1">
+            <a:schemeClr val="accent1"/>
+          </a:lnRef>
+          <a:fillRef idx="2">
+            <a:schemeClr val="accent1"/>
+          </a:fillRef>
+          <a:effectRef idx="1">
+            <a:schemeClr val="accent1"/>
+          </a:effectRef>
+          <a:fontRef idx="minor">
+            <a:schemeClr val="dk1"/>
+          </a:fontRef>
+        </p:style>
+        <p:txBody>
+          <a:bodyPr rtlCol="0" anchor="ctr"/>
+          <a:lstStyle/>
+          <a:p>
+            <a:pPr algn="ctr"/>
+            <a:endParaRPr lang="en-CN"/>
+          </a:p>
+        </p:txBody>
+      </p:sp>
+      <p:sp>
+        <p:nvSpPr>
+          <p:cNvPr id="15" name="TextBox 14">
+            <a:extLst>
+              <a:ext uri="{FF2B5EF4-FFF2-40B4-BE49-F238E27FC236}">
+                <a16:creationId xmlns:a16="http://schemas.microsoft.com/office/drawing/2014/main" id="{ACF154DA-2FFB-4DE4-3F99-1F3FF8B06B25}"/>
+              </a:ext>
+            </a:extLst>
+          </p:cNvPr>
+          <p:cNvSpPr txBox="1"/>
+          <p:nvPr/>
+        </p:nvSpPr>
+        <p:spPr>
+          <a:xfrm>
+            <a:off x="7099946" y="2074986"/>
+            <a:ext cx="1260281" cy="369332"/>
+          </a:xfrm>
+          <a:prstGeom prst="rect">
+            <a:avLst/>
+          </a:prstGeom>
+          <a:noFill/>
+        </p:spPr>
+        <p:txBody>
+          <a:bodyPr wrap="none" rtlCol="0">
+            <a:spAutoFit/>
+          </a:bodyPr>
+          <a:lstStyle/>
+          <a:p>
+            <a:r>
+              <a:rPr lang="en-CN" dirty="0"/>
+              <a:t>0x8060201</a:t>
+            </a:r>
+          </a:p>
+        </p:txBody>
+      </p:sp>
+      <p:sp>
+        <p:nvSpPr>
+          <p:cNvPr id="58" name="Rectangle 57">
+            <a:extLst>
+              <a:ext uri="{FF2B5EF4-FFF2-40B4-BE49-F238E27FC236}">
+                <a16:creationId xmlns:a16="http://schemas.microsoft.com/office/drawing/2014/main" id="{3149DC43-5AB0-1EEC-96CB-C10C4F5B57D8}"/>
+              </a:ext>
+            </a:extLst>
+          </p:cNvPr>
+          <p:cNvSpPr/>
+          <p:nvPr/>
+        </p:nvSpPr>
+        <p:spPr>
+          <a:xfrm>
+            <a:off x="5245240" y="2705802"/>
+            <a:ext cx="1245995" cy="351693"/>
+          </a:xfrm>
+          <a:prstGeom prst="rect">
+            <a:avLst/>
+          </a:prstGeom>
+        </p:spPr>
+        <p:style>
+          <a:lnRef idx="2">
+            <a:schemeClr val="accent5"/>
+          </a:lnRef>
+          <a:fillRef idx="1">
+            <a:schemeClr val="lt1"/>
+          </a:fillRef>
+          <a:effectRef idx="0">
+            <a:schemeClr val="accent5"/>
+          </a:effectRef>
+          <a:fontRef idx="minor">
+            <a:schemeClr val="dk1"/>
+          </a:fontRef>
+        </p:style>
+        <p:txBody>
+          <a:bodyPr rtlCol="0" anchor="ctr"/>
+          <a:lstStyle/>
+          <a:p>
+            <a:pPr algn="ctr"/>
+            <a:r>
+              <a:rPr lang="en-CN" dirty="0">
+                <a:solidFill>
+                  <a:srgbClr val="FFC000"/>
+                </a:solidFill>
+              </a:rPr>
+              <a:t>0000</a:t>
+            </a:r>
+            <a:r>
+              <a:rPr lang="en-US" altLang="zh-CN" dirty="0">
+                <a:solidFill>
+                  <a:srgbClr val="FFC000"/>
+                </a:solidFill>
+              </a:rPr>
+              <a:t>0</a:t>
+            </a:r>
+            <a:r>
+              <a:rPr lang="en-CN" dirty="0">
+                <a:solidFill>
+                  <a:srgbClr val="FFC000"/>
+                </a:solidFill>
+              </a:rPr>
+              <a:t>000</a:t>
+            </a:r>
+          </a:p>
+        </p:txBody>
+      </p:sp>
+      <p:sp>
+        <p:nvSpPr>
+          <p:cNvPr id="59" name="Rectangle 58">
+            <a:extLst>
+              <a:ext uri="{FF2B5EF4-FFF2-40B4-BE49-F238E27FC236}">
+                <a16:creationId xmlns:a16="http://schemas.microsoft.com/office/drawing/2014/main" id="{7ECDE663-37D5-1938-1659-DE3CE3DB760D}"/>
+              </a:ext>
+            </a:extLst>
+          </p:cNvPr>
+          <p:cNvSpPr/>
+          <p:nvPr/>
+        </p:nvSpPr>
+        <p:spPr>
+          <a:xfrm>
+            <a:off x="6491235" y="2705802"/>
+            <a:ext cx="1245995" cy="351693"/>
+          </a:xfrm>
+          <a:prstGeom prst="rect">
+            <a:avLst/>
+          </a:prstGeom>
+        </p:spPr>
+        <p:style>
+          <a:lnRef idx="2">
+            <a:schemeClr val="accent5"/>
+          </a:lnRef>
+          <a:fillRef idx="1">
+            <a:schemeClr val="lt1"/>
+          </a:fillRef>
+          <a:effectRef idx="0">
+            <a:schemeClr val="accent5"/>
+          </a:effectRef>
+          <a:fontRef idx="minor">
+            <a:schemeClr val="dk1"/>
+          </a:fontRef>
+        </p:style>
+        <p:txBody>
+          <a:bodyPr rtlCol="0" anchor="ctr"/>
+          <a:lstStyle/>
+          <a:p>
+            <a:pPr algn="ctr"/>
+            <a:r>
+              <a:rPr lang="en-CN" dirty="0"/>
+              <a:t>00000</a:t>
+            </a:r>
+            <a:r>
+              <a:rPr lang="en-US" altLang="zh-CN" dirty="0"/>
+              <a:t>00</a:t>
+            </a:r>
+            <a:r>
+              <a:rPr lang="en-CN" dirty="0"/>
+              <a:t>0</a:t>
+            </a:r>
+          </a:p>
+        </p:txBody>
+      </p:sp>
+      <p:sp>
+        <p:nvSpPr>
+          <p:cNvPr id="60" name="Rectangle 59">
+            <a:extLst>
+              <a:ext uri="{FF2B5EF4-FFF2-40B4-BE49-F238E27FC236}">
+                <a16:creationId xmlns:a16="http://schemas.microsoft.com/office/drawing/2014/main" id="{41BB8235-2EF9-83D6-5269-711C47084B1B}"/>
+              </a:ext>
+            </a:extLst>
+          </p:cNvPr>
+          <p:cNvSpPr/>
+          <p:nvPr/>
+        </p:nvSpPr>
+        <p:spPr>
+          <a:xfrm>
+            <a:off x="7737230" y="2705801"/>
+            <a:ext cx="1245995" cy="351693"/>
+          </a:xfrm>
+          <a:prstGeom prst="rect">
+            <a:avLst/>
+          </a:prstGeom>
+        </p:spPr>
+        <p:style>
+          <a:lnRef idx="2">
+            <a:schemeClr val="accent5"/>
+          </a:lnRef>
+          <a:fillRef idx="1">
+            <a:schemeClr val="lt1"/>
+          </a:fillRef>
+          <a:effectRef idx="0">
+            <a:schemeClr val="accent5"/>
+          </a:effectRef>
+          <a:fontRef idx="minor">
+            <a:schemeClr val="dk1"/>
+          </a:fontRef>
+        </p:style>
+        <p:txBody>
+          <a:bodyPr rtlCol="0" anchor="ctr"/>
+          <a:lstStyle/>
+          <a:p>
+            <a:pPr algn="ctr"/>
+            <a:r>
+              <a:rPr lang="en-CN" dirty="0"/>
+              <a:t>000000</a:t>
+            </a:r>
+            <a:r>
+              <a:rPr lang="en-US" altLang="zh-CN" dirty="0"/>
+              <a:t>0</a:t>
+            </a:r>
+            <a:r>
+              <a:rPr lang="en-CN" dirty="0"/>
+              <a:t>0</a:t>
+            </a:r>
+          </a:p>
+        </p:txBody>
+      </p:sp>
+      <p:sp>
+        <p:nvSpPr>
+          <p:cNvPr id="61" name="Rectangle 60">
+            <a:extLst>
+              <a:ext uri="{FF2B5EF4-FFF2-40B4-BE49-F238E27FC236}">
+                <a16:creationId xmlns:a16="http://schemas.microsoft.com/office/drawing/2014/main" id="{89AB65A7-2B76-A439-BE34-5CE624E7DF6E}"/>
+              </a:ext>
+            </a:extLst>
+          </p:cNvPr>
+          <p:cNvSpPr/>
+          <p:nvPr/>
+        </p:nvSpPr>
+        <p:spPr>
+          <a:xfrm>
+            <a:off x="8983225" y="2705800"/>
+            <a:ext cx="1245995" cy="351693"/>
+          </a:xfrm>
+          <a:prstGeom prst="rect">
+            <a:avLst/>
+          </a:prstGeom>
+        </p:spPr>
+        <p:style>
+          <a:lnRef idx="2">
+            <a:schemeClr val="accent5"/>
+          </a:lnRef>
+          <a:fillRef idx="1">
+            <a:schemeClr val="lt1"/>
+          </a:fillRef>
+          <a:effectRef idx="0">
+            <a:schemeClr val="accent5"/>
+          </a:effectRef>
+          <a:fontRef idx="minor">
+            <a:schemeClr val="dk1"/>
+          </a:fontRef>
+        </p:style>
+        <p:txBody>
+          <a:bodyPr rtlCol="0" anchor="ctr"/>
+          <a:lstStyle/>
+          <a:p>
+            <a:pPr algn="ctr"/>
+            <a:r>
+              <a:rPr lang="en-CN" dirty="0">
+                <a:solidFill>
+                  <a:srgbClr val="FF0000"/>
+                </a:solidFill>
+              </a:rPr>
+              <a:t>00000001</a:t>
+            </a:r>
+          </a:p>
+        </p:txBody>
+      </p:sp>
+      <p:sp>
+        <p:nvSpPr>
+          <p:cNvPr id="62" name="TextBox 61">
+            <a:extLst>
+              <a:ext uri="{FF2B5EF4-FFF2-40B4-BE49-F238E27FC236}">
+                <a16:creationId xmlns:a16="http://schemas.microsoft.com/office/drawing/2014/main" id="{2AE113A7-33EC-8C6D-68BA-C28D12B2FC04}"/>
+              </a:ext>
+            </a:extLst>
+          </p:cNvPr>
+          <p:cNvSpPr txBox="1"/>
+          <p:nvPr/>
+        </p:nvSpPr>
+        <p:spPr>
+          <a:xfrm>
+            <a:off x="5524769" y="2346513"/>
+            <a:ext cx="686936" cy="369332"/>
+          </a:xfrm>
+          <a:prstGeom prst="rect">
+            <a:avLst/>
+          </a:prstGeom>
+          <a:noFill/>
+        </p:spPr>
+        <p:txBody>
+          <a:bodyPr wrap="square" rtlCol="0">
+            <a:spAutoFit/>
+          </a:bodyPr>
+          <a:lstStyle/>
+          <a:p>
+            <a:r>
+              <a:rPr lang="en-CN" dirty="0">
+                <a:ln w="0"/>
+                <a:solidFill>
+                  <a:schemeClr val="accent1"/>
+                </a:solidFill>
+                <a:effectLst>
+                  <a:outerShdw blurRad="38100" dist="25400" dir="5400000" algn="ctr" rotWithShape="0">
+                    <a:srgbClr val="6E747A">
+                      <a:alpha val="43000"/>
+                    </a:srgbClr>
+                  </a:outerShdw>
+                </a:effectLst>
+              </a:rPr>
+              <a:t>[</a:t>
+            </a:r>
+            <a:r>
+              <a:rPr lang="en-US" altLang="zh-CN" dirty="0">
+                <a:ln w="0"/>
+                <a:solidFill>
+                  <a:schemeClr val="accent1"/>
+                </a:solidFill>
+                <a:effectLst>
+                  <a:outerShdw blurRad="38100" dist="25400" dir="5400000" algn="ctr" rotWithShape="0">
+                    <a:srgbClr val="6E747A">
+                      <a:alpha val="43000"/>
+                    </a:srgbClr>
+                  </a:outerShdw>
+                </a:effectLst>
+              </a:rPr>
+              <a:t>1</a:t>
+            </a:r>
+            <a:r>
+              <a:rPr lang="en-CN" dirty="0">
+                <a:ln w="0"/>
+                <a:solidFill>
+                  <a:schemeClr val="accent1"/>
+                </a:solidFill>
+                <a:effectLst>
+                  <a:outerShdw blurRad="38100" dist="25400" dir="5400000" algn="ctr" rotWithShape="0">
+                    <a:srgbClr val="6E747A">
+                      <a:alpha val="43000"/>
+                    </a:srgbClr>
+                  </a:outerShdw>
+                </a:effectLst>
+              </a:rPr>
+              <a:t>00]</a:t>
+            </a:r>
+          </a:p>
+        </p:txBody>
+      </p:sp>
+      <p:sp>
+        <p:nvSpPr>
+          <p:cNvPr id="63" name="TextBox 62">
+            <a:extLst>
+              <a:ext uri="{FF2B5EF4-FFF2-40B4-BE49-F238E27FC236}">
+                <a16:creationId xmlns:a16="http://schemas.microsoft.com/office/drawing/2014/main" id="{1A64E053-6683-574C-DC82-46352D0AC0E4}"/>
+              </a:ext>
+            </a:extLst>
+          </p:cNvPr>
+          <p:cNvSpPr txBox="1"/>
+          <p:nvPr/>
+        </p:nvSpPr>
+        <p:spPr>
+          <a:xfrm>
+            <a:off x="6770764" y="2346513"/>
+            <a:ext cx="686936" cy="369332"/>
+          </a:xfrm>
+          <a:prstGeom prst="rect">
+            <a:avLst/>
+          </a:prstGeom>
+          <a:noFill/>
+        </p:spPr>
+        <p:txBody>
+          <a:bodyPr wrap="square" rtlCol="0">
+            <a:spAutoFit/>
+          </a:bodyPr>
+          <a:lstStyle/>
+          <a:p>
+            <a:r>
+              <a:rPr lang="en-CN" dirty="0">
+                <a:ln w="0"/>
+                <a:solidFill>
+                  <a:schemeClr val="accent1"/>
+                </a:solidFill>
+                <a:effectLst>
+                  <a:outerShdw blurRad="38100" dist="25400" dir="5400000" algn="ctr" rotWithShape="0">
+                    <a:srgbClr val="6E747A">
+                      <a:alpha val="43000"/>
+                    </a:srgbClr>
+                  </a:outerShdw>
+                </a:effectLst>
+              </a:rPr>
+              <a:t>[</a:t>
+            </a:r>
+            <a:r>
+              <a:rPr lang="en-US" altLang="zh-CN" dirty="0">
+                <a:ln w="0"/>
+                <a:solidFill>
+                  <a:schemeClr val="accent1"/>
+                </a:solidFill>
+                <a:effectLst>
+                  <a:outerShdw blurRad="38100" dist="25400" dir="5400000" algn="ctr" rotWithShape="0">
+                    <a:srgbClr val="6E747A">
+                      <a:alpha val="43000"/>
+                    </a:srgbClr>
+                  </a:outerShdw>
+                </a:effectLst>
+              </a:rPr>
+              <a:t>1</a:t>
+            </a:r>
+            <a:r>
+              <a:rPr lang="en-CN" dirty="0">
+                <a:ln w="0"/>
+                <a:solidFill>
+                  <a:schemeClr val="accent1"/>
+                </a:solidFill>
+                <a:effectLst>
+                  <a:outerShdw blurRad="38100" dist="25400" dir="5400000" algn="ctr" rotWithShape="0">
+                    <a:srgbClr val="6E747A">
+                      <a:alpha val="43000"/>
+                    </a:srgbClr>
+                  </a:outerShdw>
+                </a:effectLst>
+              </a:rPr>
+              <a:t>01]</a:t>
+            </a:r>
+          </a:p>
+        </p:txBody>
+      </p:sp>
+      <p:sp>
+        <p:nvSpPr>
+          <p:cNvPr id="64" name="TextBox 63">
+            <a:extLst>
+              <a:ext uri="{FF2B5EF4-FFF2-40B4-BE49-F238E27FC236}">
+                <a16:creationId xmlns:a16="http://schemas.microsoft.com/office/drawing/2014/main" id="{A336CAEE-19C0-7079-ADFD-485F127DAEA5}"/>
+              </a:ext>
+            </a:extLst>
+          </p:cNvPr>
+          <p:cNvSpPr txBox="1"/>
+          <p:nvPr/>
+        </p:nvSpPr>
+        <p:spPr>
+          <a:xfrm>
+            <a:off x="8016759" y="2346513"/>
+            <a:ext cx="686936" cy="369332"/>
+          </a:xfrm>
+          <a:prstGeom prst="rect">
+            <a:avLst/>
+          </a:prstGeom>
+          <a:noFill/>
+        </p:spPr>
+        <p:txBody>
+          <a:bodyPr wrap="square" rtlCol="0">
+            <a:spAutoFit/>
+          </a:bodyPr>
+          <a:lstStyle/>
+          <a:p>
+            <a:r>
+              <a:rPr lang="en-CN" dirty="0">
+                <a:ln w="0"/>
+                <a:solidFill>
+                  <a:schemeClr val="accent1"/>
+                </a:solidFill>
+                <a:effectLst>
+                  <a:outerShdw blurRad="38100" dist="25400" dir="5400000" algn="ctr" rotWithShape="0">
+                    <a:srgbClr val="6E747A">
+                      <a:alpha val="43000"/>
+                    </a:srgbClr>
+                  </a:outerShdw>
+                </a:effectLst>
+              </a:rPr>
+              <a:t>[</a:t>
+            </a:r>
+            <a:r>
+              <a:rPr lang="en-US" altLang="zh-CN" dirty="0">
+                <a:ln w="0"/>
+                <a:solidFill>
+                  <a:schemeClr val="accent1"/>
+                </a:solidFill>
+                <a:effectLst>
+                  <a:outerShdw blurRad="38100" dist="25400" dir="5400000" algn="ctr" rotWithShape="0">
+                    <a:srgbClr val="6E747A">
+                      <a:alpha val="43000"/>
+                    </a:srgbClr>
+                  </a:outerShdw>
+                </a:effectLst>
+              </a:rPr>
+              <a:t>1</a:t>
+            </a:r>
+            <a:r>
+              <a:rPr lang="en-CN" dirty="0">
+                <a:ln w="0"/>
+                <a:solidFill>
+                  <a:schemeClr val="accent1"/>
+                </a:solidFill>
+                <a:effectLst>
+                  <a:outerShdw blurRad="38100" dist="25400" dir="5400000" algn="ctr" rotWithShape="0">
+                    <a:srgbClr val="6E747A">
+                      <a:alpha val="43000"/>
+                    </a:srgbClr>
+                  </a:outerShdw>
+                </a:effectLst>
+              </a:rPr>
+              <a:t>10]</a:t>
+            </a:r>
+          </a:p>
+        </p:txBody>
+      </p:sp>
+      <p:sp>
+        <p:nvSpPr>
+          <p:cNvPr id="65" name="TextBox 64">
+            <a:extLst>
+              <a:ext uri="{FF2B5EF4-FFF2-40B4-BE49-F238E27FC236}">
+                <a16:creationId xmlns:a16="http://schemas.microsoft.com/office/drawing/2014/main" id="{F93BF485-7494-7D9D-FF21-DD61D5D7968B}"/>
+              </a:ext>
+            </a:extLst>
+          </p:cNvPr>
+          <p:cNvSpPr txBox="1"/>
+          <p:nvPr/>
+        </p:nvSpPr>
+        <p:spPr>
+          <a:xfrm>
+            <a:off x="9262754" y="2336467"/>
+            <a:ext cx="686936" cy="369332"/>
+          </a:xfrm>
+          <a:prstGeom prst="rect">
+            <a:avLst/>
+          </a:prstGeom>
+          <a:noFill/>
+        </p:spPr>
+        <p:txBody>
+          <a:bodyPr wrap="square" rtlCol="0">
+            <a:spAutoFit/>
+          </a:bodyPr>
+          <a:lstStyle/>
+          <a:p>
+            <a:r>
+              <a:rPr lang="en-CN" dirty="0">
+                <a:ln w="0"/>
+                <a:solidFill>
+                  <a:schemeClr val="accent1"/>
+                </a:solidFill>
+                <a:effectLst>
+                  <a:outerShdw blurRad="38100" dist="25400" dir="5400000" algn="ctr" rotWithShape="0">
+                    <a:srgbClr val="6E747A">
+                      <a:alpha val="43000"/>
+                    </a:srgbClr>
+                  </a:outerShdw>
+                </a:effectLst>
+              </a:rPr>
+              <a:t>[</a:t>
+            </a:r>
+            <a:r>
+              <a:rPr lang="en-US" altLang="zh-CN" dirty="0">
+                <a:ln w="0"/>
+                <a:solidFill>
+                  <a:schemeClr val="accent1"/>
+                </a:solidFill>
+                <a:effectLst>
+                  <a:outerShdw blurRad="38100" dist="25400" dir="5400000" algn="ctr" rotWithShape="0">
+                    <a:srgbClr val="6E747A">
+                      <a:alpha val="43000"/>
+                    </a:srgbClr>
+                  </a:outerShdw>
+                </a:effectLst>
+              </a:rPr>
+              <a:t>1</a:t>
+            </a:r>
+            <a:r>
+              <a:rPr lang="en-CN" dirty="0">
+                <a:ln w="0"/>
+                <a:solidFill>
+                  <a:schemeClr val="accent1"/>
+                </a:solidFill>
+                <a:effectLst>
+                  <a:outerShdw blurRad="38100" dist="25400" dir="5400000" algn="ctr" rotWithShape="0">
+                    <a:srgbClr val="6E747A">
+                      <a:alpha val="43000"/>
+                    </a:srgbClr>
+                  </a:outerShdw>
+                </a:effectLst>
+              </a:rPr>
+              <a:t>11]</a:t>
+            </a:r>
+          </a:p>
+        </p:txBody>
+      </p:sp>
+      <p:sp>
+        <p:nvSpPr>
+          <p:cNvPr id="66" name="Down Arrow 65">
+            <a:extLst>
+              <a:ext uri="{FF2B5EF4-FFF2-40B4-BE49-F238E27FC236}">
+                <a16:creationId xmlns:a16="http://schemas.microsoft.com/office/drawing/2014/main" id="{69BB6138-DE47-63B1-7AB2-A4762EC7E8F1}"/>
+              </a:ext>
+            </a:extLst>
+          </p:cNvPr>
+          <p:cNvSpPr/>
+          <p:nvPr/>
+        </p:nvSpPr>
+        <p:spPr>
+          <a:xfrm>
+            <a:off x="7416594" y="3163002"/>
+            <a:ext cx="641271" cy="286378"/>
+          </a:xfrm>
+          <a:prstGeom prst="downArrow">
+            <a:avLst/>
+          </a:prstGeom>
+        </p:spPr>
+        <p:style>
+          <a:lnRef idx="1">
+            <a:schemeClr val="accent1"/>
+          </a:lnRef>
+          <a:fillRef idx="2">
+            <a:schemeClr val="accent1"/>
+          </a:fillRef>
+          <a:effectRef idx="1">
+            <a:schemeClr val="accent1"/>
+          </a:effectRef>
+          <a:fontRef idx="minor">
+            <a:schemeClr val="dk1"/>
+          </a:fontRef>
+        </p:style>
+        <p:txBody>
+          <a:bodyPr rtlCol="0" anchor="ctr"/>
+          <a:lstStyle/>
+          <a:p>
+            <a:pPr algn="ctr"/>
+            <a:endParaRPr lang="en-CN"/>
+          </a:p>
+        </p:txBody>
+      </p:sp>
+      <p:sp>
+        <p:nvSpPr>
+          <p:cNvPr id="67" name="TextBox 66">
+            <a:extLst>
+              <a:ext uri="{FF2B5EF4-FFF2-40B4-BE49-F238E27FC236}">
+                <a16:creationId xmlns:a16="http://schemas.microsoft.com/office/drawing/2014/main" id="{78F509C7-A20E-9C54-6A9D-A380E5DAA1BE}"/>
+              </a:ext>
+            </a:extLst>
+          </p:cNvPr>
+          <p:cNvSpPr txBox="1"/>
+          <p:nvPr/>
+        </p:nvSpPr>
+        <p:spPr>
+          <a:xfrm>
+            <a:off x="7485621" y="3580008"/>
+            <a:ext cx="529312" cy="369332"/>
+          </a:xfrm>
+          <a:prstGeom prst="rect">
+            <a:avLst/>
+          </a:prstGeom>
+          <a:noFill/>
+        </p:spPr>
+        <p:txBody>
+          <a:bodyPr wrap="none" rtlCol="0">
+            <a:spAutoFit/>
+          </a:bodyPr>
+          <a:lstStyle/>
+          <a:p>
+            <a:r>
+              <a:rPr lang="en-US" altLang="zh-CN" dirty="0"/>
+              <a:t>0x1</a:t>
+            </a:r>
+            <a:endParaRPr lang="en-CN" dirty="0"/>
+          </a:p>
+        </p:txBody>
+      </p:sp>
+      <p:sp>
+        <p:nvSpPr>
+          <p:cNvPr id="68" name="TextBox 67">
+            <a:extLst>
+              <a:ext uri="{FF2B5EF4-FFF2-40B4-BE49-F238E27FC236}">
+                <a16:creationId xmlns:a16="http://schemas.microsoft.com/office/drawing/2014/main" id="{F02B0ECC-9FE5-4913-DBC9-42EB931E214C}"/>
+              </a:ext>
+            </a:extLst>
+          </p:cNvPr>
+          <p:cNvSpPr txBox="1"/>
+          <p:nvPr/>
+        </p:nvSpPr>
+        <p:spPr>
+          <a:xfrm>
+            <a:off x="8360103" y="4195749"/>
+            <a:ext cx="1805302" cy="369332"/>
+          </a:xfrm>
+          <a:prstGeom prst="rect">
+            <a:avLst/>
+          </a:prstGeom>
+          <a:noFill/>
+        </p:spPr>
+        <p:txBody>
+          <a:bodyPr wrap="none" rtlCol="0">
+            <a:spAutoFit/>
+          </a:bodyPr>
+          <a:lstStyle/>
+          <a:p>
+            <a:r>
+              <a:rPr lang="en-CN" dirty="0"/>
+              <a:t>0x表示</a:t>
+            </a:r>
+            <a:r>
+              <a:rPr lang="en-US" altLang="zh-CN" dirty="0"/>
+              <a:t>16</a:t>
+            </a:r>
+            <a:r>
+              <a:rPr lang="zh-CN" altLang="en-US" dirty="0"/>
+              <a:t>进制。</a:t>
+            </a:r>
+            <a:endParaRPr lang="en-CN" dirty="0"/>
+          </a:p>
+        </p:txBody>
+      </p:sp>
+    </p:spTree>
+    <p:extLst>
+      <p:ext uri="{BB962C8B-B14F-4D97-AF65-F5344CB8AC3E}">
+        <p14:creationId xmlns:p14="http://schemas.microsoft.com/office/powerpoint/2010/main" val="2242420439"/>
+      </p:ext>
+    </p:extLst>
+  </p:cSld>
+  <p:clrMapOvr>
+    <a:masterClrMapping/>
+  </p:clrMapOvr>
+</p:sld>
+</file>
+
 <file path=ppt/theme/theme1.xml><?xml version="1.0" encoding="utf-8"?>
 <a:theme xmlns:a="http://schemas.openxmlformats.org/drawingml/2006/main" name="Office 主题​​">
   <a:themeElements>

</xml_diff>

<commit_message>
finishing the last 14 discriptions
</commit_message>
<xml_diff>
--- a/8bit_design/CPU.pptx
+++ b/8bit_design/CPU.pptx
@@ -10,7 +10,6 @@
     <p:sldId id="258" r:id="rId4"/>
     <p:sldId id="261" r:id="rId5"/>
     <p:sldId id="260" r:id="rId6"/>
-    <p:sldId id="262" r:id="rId7"/>
   </p:sldIdLst>
   <p:sldSz cx="12192000" cy="6858000"/>
   <p:notesSz cx="6858000" cy="9144000"/>
@@ -264,7 +263,7 @@
           <a:p>
             <a:fld id="{3DA55360-DDDC-4346-A6FA-426842ECECBE}" type="datetimeFigureOut">
               <a:rPr kumimoji="1" lang="zh-CN" altLang="en-US" smtClean="0"/>
-              <a:t>2024/3/3</a:t>
+              <a:t>2024/2/13</a:t>
             </a:fld>
             <a:endParaRPr kumimoji="1" lang="zh-CN" altLang="en-US"/>
           </a:p>
@@ -462,7 +461,7 @@
           <a:p>
             <a:fld id="{3DA55360-DDDC-4346-A6FA-426842ECECBE}" type="datetimeFigureOut">
               <a:rPr kumimoji="1" lang="zh-CN" altLang="en-US" smtClean="0"/>
-              <a:t>2024/3/3</a:t>
+              <a:t>2024/2/13</a:t>
             </a:fld>
             <a:endParaRPr kumimoji="1" lang="zh-CN" altLang="en-US"/>
           </a:p>
@@ -670,7 +669,7 @@
           <a:p>
             <a:fld id="{3DA55360-DDDC-4346-A6FA-426842ECECBE}" type="datetimeFigureOut">
               <a:rPr kumimoji="1" lang="zh-CN" altLang="en-US" smtClean="0"/>
-              <a:t>2024/3/3</a:t>
+              <a:t>2024/2/13</a:t>
             </a:fld>
             <a:endParaRPr kumimoji="1" lang="zh-CN" altLang="en-US"/>
           </a:p>
@@ -868,7 +867,7 @@
           <a:p>
             <a:fld id="{3DA55360-DDDC-4346-A6FA-426842ECECBE}" type="datetimeFigureOut">
               <a:rPr kumimoji="1" lang="zh-CN" altLang="en-US" smtClean="0"/>
-              <a:t>2024/3/3</a:t>
+              <a:t>2024/2/13</a:t>
             </a:fld>
             <a:endParaRPr kumimoji="1" lang="zh-CN" altLang="en-US"/>
           </a:p>
@@ -1143,7 +1142,7 @@
           <a:p>
             <a:fld id="{3DA55360-DDDC-4346-A6FA-426842ECECBE}" type="datetimeFigureOut">
               <a:rPr kumimoji="1" lang="zh-CN" altLang="en-US" smtClean="0"/>
-              <a:t>2024/3/3</a:t>
+              <a:t>2024/2/13</a:t>
             </a:fld>
             <a:endParaRPr kumimoji="1" lang="zh-CN" altLang="en-US"/>
           </a:p>
@@ -1408,7 +1407,7 @@
           <a:p>
             <a:fld id="{3DA55360-DDDC-4346-A6FA-426842ECECBE}" type="datetimeFigureOut">
               <a:rPr kumimoji="1" lang="zh-CN" altLang="en-US" smtClean="0"/>
-              <a:t>2024/3/3</a:t>
+              <a:t>2024/2/13</a:t>
             </a:fld>
             <a:endParaRPr kumimoji="1" lang="zh-CN" altLang="en-US"/>
           </a:p>
@@ -1820,7 +1819,7 @@
           <a:p>
             <a:fld id="{3DA55360-DDDC-4346-A6FA-426842ECECBE}" type="datetimeFigureOut">
               <a:rPr kumimoji="1" lang="zh-CN" altLang="en-US" smtClean="0"/>
-              <a:t>2024/3/3</a:t>
+              <a:t>2024/2/13</a:t>
             </a:fld>
             <a:endParaRPr kumimoji="1" lang="zh-CN" altLang="en-US"/>
           </a:p>
@@ -1961,7 +1960,7 @@
           <a:p>
             <a:fld id="{3DA55360-DDDC-4346-A6FA-426842ECECBE}" type="datetimeFigureOut">
               <a:rPr kumimoji="1" lang="zh-CN" altLang="en-US" smtClean="0"/>
-              <a:t>2024/3/3</a:t>
+              <a:t>2024/2/13</a:t>
             </a:fld>
             <a:endParaRPr kumimoji="1" lang="zh-CN" altLang="en-US"/>
           </a:p>
@@ -2074,7 +2073,7 @@
           <a:p>
             <a:fld id="{3DA55360-DDDC-4346-A6FA-426842ECECBE}" type="datetimeFigureOut">
               <a:rPr kumimoji="1" lang="zh-CN" altLang="en-US" smtClean="0"/>
-              <a:t>2024/3/3</a:t>
+              <a:t>2024/2/13</a:t>
             </a:fld>
             <a:endParaRPr kumimoji="1" lang="zh-CN" altLang="en-US"/>
           </a:p>
@@ -2385,7 +2384,7 @@
           <a:p>
             <a:fld id="{3DA55360-DDDC-4346-A6FA-426842ECECBE}" type="datetimeFigureOut">
               <a:rPr kumimoji="1" lang="zh-CN" altLang="en-US" smtClean="0"/>
-              <a:t>2024/3/3</a:t>
+              <a:t>2024/2/13</a:t>
             </a:fld>
             <a:endParaRPr kumimoji="1" lang="zh-CN" altLang="en-US"/>
           </a:p>
@@ -2673,7 +2672,7 @@
           <a:p>
             <a:fld id="{3DA55360-DDDC-4346-A6FA-426842ECECBE}" type="datetimeFigureOut">
               <a:rPr kumimoji="1" lang="zh-CN" altLang="en-US" smtClean="0"/>
-              <a:t>2024/3/3</a:t>
+              <a:t>2024/2/13</a:t>
             </a:fld>
             <a:endParaRPr kumimoji="1" lang="zh-CN" altLang="en-US"/>
           </a:p>
@@ -2914,7 +2913,7 @@
           <a:p>
             <a:fld id="{3DA55360-DDDC-4346-A6FA-426842ECECBE}" type="datetimeFigureOut">
               <a:rPr kumimoji="1" lang="zh-CN" altLang="en-US" smtClean="0"/>
-              <a:t>2024/3/3</a:t>
+              <a:t>2024/2/13</a:t>
             </a:fld>
             <a:endParaRPr kumimoji="1" lang="zh-CN" altLang="en-US"/>
           </a:p>
@@ -14656,1825 +14655,6 @@
 </p:sld>
 </file>
 
-<file path=ppt/slides/slide6.xml><?xml version="1.0" encoding="utf-8"?>
-<p:sld xmlns:a="http://schemas.openxmlformats.org/drawingml/2006/main" xmlns:r="http://schemas.openxmlformats.org/officeDocument/2006/relationships" xmlns:p="http://schemas.openxmlformats.org/presentationml/2006/main">
-  <p:cSld>
-    <p:spTree>
-      <p:nvGrpSpPr>
-        <p:cNvPr id="1" name=""/>
-        <p:cNvGrpSpPr/>
-        <p:nvPr/>
-      </p:nvGrpSpPr>
-      <p:grpSpPr>
-        <a:xfrm>
-          <a:off x="0" y="0"/>
-          <a:ext cx="0" cy="0"/>
-          <a:chOff x="0" y="0"/>
-          <a:chExt cx="0" cy="0"/>
-        </a:xfrm>
-      </p:grpSpPr>
-      <p:graphicFrame>
-        <p:nvGraphicFramePr>
-          <p:cNvPr id="2" name="Table 1">
-            <a:extLst>
-              <a:ext uri="{FF2B5EF4-FFF2-40B4-BE49-F238E27FC236}">
-                <a16:creationId xmlns:a16="http://schemas.microsoft.com/office/drawing/2014/main" id="{D25BBB04-1E65-B8BD-FC2B-28394D2FFCDB}"/>
-              </a:ext>
-            </a:extLst>
-          </p:cNvPr>
-          <p:cNvGraphicFramePr>
-            <a:graphicFrameLocks noGrp="1"/>
-          </p:cNvGraphicFramePr>
-          <p:nvPr>
-            <p:extLst>
-              <p:ext uri="{D42A27DB-BD31-4B8C-83A1-F6EECF244321}">
-                <p14:modId xmlns:p14="http://schemas.microsoft.com/office/powerpoint/2010/main" val="2664214462"/>
-              </p:ext>
-            </p:extLst>
-          </p:nvPr>
-        </p:nvGraphicFramePr>
-        <p:xfrm>
-          <a:off x="1842812" y="630620"/>
-          <a:ext cx="2484380" cy="3703320"/>
-        </p:xfrm>
-        <a:graphic>
-          <a:graphicData uri="http://schemas.openxmlformats.org/drawingml/2006/table">
-            <a:tbl>
-              <a:tblPr firstRow="1" bandRow="1">
-                <a:tableStyleId>{5C22544A-7EE6-4342-B048-85BDC9FD1C3A}</a:tableStyleId>
-              </a:tblPr>
-              <a:tblGrid>
-                <a:gridCol w="1325906">
-                  <a:extLst>
-                    <a:ext uri="{9D8B030D-6E8A-4147-A177-3AD203B41FA5}">
-                      <a16:colId xmlns:a16="http://schemas.microsoft.com/office/drawing/2014/main" val="2459382653"/>
-                    </a:ext>
-                  </a:extLst>
-                </a:gridCol>
-                <a:gridCol w="1158474">
-                  <a:extLst>
-                    <a:ext uri="{9D8B030D-6E8A-4147-A177-3AD203B41FA5}">
-                      <a16:colId xmlns:a16="http://schemas.microsoft.com/office/drawing/2014/main" val="4188676412"/>
-                    </a:ext>
-                  </a:extLst>
-                </a:gridCol>
-              </a:tblGrid>
-              <a:tr h="270699">
-                <a:tc>
-                  <a:txBody>
-                    <a:bodyPr/>
-                    <a:lstStyle/>
-                    <a:p>
-                      <a:pPr algn="ctr"/>
-                      <a:r>
-                        <a:rPr lang="en-CN" dirty="0"/>
-                        <a:t>ADDRESS</a:t>
-                      </a:r>
-                    </a:p>
-                  </a:txBody>
-                  <a:tcPr/>
-                </a:tc>
-                <a:tc>
-                  <a:txBody>
-                    <a:bodyPr/>
-                    <a:lstStyle/>
-                    <a:p>
-                      <a:pPr algn="ctr"/>
-                      <a:r>
-                        <a:rPr lang="en-CN" dirty="0"/>
-                        <a:t>DATA</a:t>
-                      </a:r>
-                    </a:p>
-                  </a:txBody>
-                  <a:tcPr/>
-                </a:tc>
-                <a:extLst>
-                  <a:ext uri="{0D108BD9-81ED-4DB2-BD59-A6C34878D82A}">
-                    <a16:rowId xmlns:a16="http://schemas.microsoft.com/office/drawing/2014/main" val="2396642285"/>
-                  </a:ext>
-                </a:extLst>
-              </a:tr>
-              <a:tr h="370840">
-                <a:tc>
-                  <a:txBody>
-                    <a:bodyPr/>
-                    <a:lstStyle/>
-                    <a:p>
-                      <a:pPr algn="ctr"/>
-                      <a:r>
-                        <a:rPr lang="en-US" altLang="zh-CN" dirty="0"/>
-                        <a:t>0x00</a:t>
-                      </a:r>
-                      <a:endParaRPr lang="en-CN" dirty="0"/>
-                    </a:p>
-                  </a:txBody>
-                  <a:tcPr/>
-                </a:tc>
-                <a:tc>
-                  <a:txBody>
-                    <a:bodyPr/>
-                    <a:lstStyle/>
-                    <a:p>
-                      <a:pPr algn="ctr"/>
-                      <a:r>
-                        <a:rPr lang="en-US" altLang="zh-CN" dirty="0">
-                          <a:solidFill>
-                            <a:srgbClr val="FF0000"/>
-                          </a:solidFill>
-                        </a:rPr>
-                        <a:t>0x01</a:t>
-                      </a:r>
-                      <a:endParaRPr lang="en-CN" dirty="0">
-                        <a:solidFill>
-                          <a:srgbClr val="FF0000"/>
-                        </a:solidFill>
-                      </a:endParaRPr>
-                    </a:p>
-                  </a:txBody>
-                  <a:tcPr/>
-                </a:tc>
-                <a:extLst>
-                  <a:ext uri="{0D108BD9-81ED-4DB2-BD59-A6C34878D82A}">
-                    <a16:rowId xmlns:a16="http://schemas.microsoft.com/office/drawing/2014/main" val="751872452"/>
-                  </a:ext>
-                </a:extLst>
-              </a:tr>
-              <a:tr h="370840">
-                <a:tc>
-                  <a:txBody>
-                    <a:bodyPr/>
-                    <a:lstStyle/>
-                    <a:p>
-                      <a:pPr algn="ctr"/>
-                      <a:r>
-                        <a:rPr lang="en-US" altLang="zh-CN" dirty="0"/>
-                        <a:t>0x01</a:t>
-                      </a:r>
-                      <a:endParaRPr lang="en-CN" dirty="0"/>
-                    </a:p>
-                  </a:txBody>
-                  <a:tcPr/>
-                </a:tc>
-                <a:tc>
-                  <a:txBody>
-                    <a:bodyPr/>
-                    <a:lstStyle/>
-                    <a:p>
-                      <a:pPr algn="ctr"/>
-                      <a:r>
-                        <a:rPr lang="en-US" dirty="0"/>
-                        <a:t>0x02</a:t>
-                      </a:r>
-                      <a:endParaRPr lang="en-CN" dirty="0"/>
-                    </a:p>
-                  </a:txBody>
-                  <a:tcPr/>
-                </a:tc>
-                <a:extLst>
-                  <a:ext uri="{0D108BD9-81ED-4DB2-BD59-A6C34878D82A}">
-                    <a16:rowId xmlns:a16="http://schemas.microsoft.com/office/drawing/2014/main" val="3503078896"/>
-                  </a:ext>
-                </a:extLst>
-              </a:tr>
-              <a:tr h="370840">
-                <a:tc>
-                  <a:txBody>
-                    <a:bodyPr/>
-                    <a:lstStyle/>
-                    <a:p>
-                      <a:pPr algn="ctr"/>
-                      <a:r>
-                        <a:rPr lang="en-US" altLang="zh-CN" dirty="0"/>
-                        <a:t>0x</a:t>
-                      </a:r>
-                      <a:r>
-                        <a:rPr lang="en-CN" dirty="0"/>
-                        <a:t>02</a:t>
-                      </a:r>
-                    </a:p>
-                  </a:txBody>
-                  <a:tcPr/>
-                </a:tc>
-                <a:tc>
-                  <a:txBody>
-                    <a:bodyPr/>
-                    <a:lstStyle/>
-                    <a:p>
-                      <a:pPr marL="0" marR="0" lvl="0" indent="0" algn="ctr" defTabSz="914400" rtl="0" eaLnBrk="1" fontAlgn="auto" latinLnBrk="0" hangingPunct="1">
-                        <a:lnSpc>
-                          <a:spcPct val="100000"/>
-                        </a:lnSpc>
-                        <a:spcBef>
-                          <a:spcPts val="0"/>
-                        </a:spcBef>
-                        <a:spcAft>
-                          <a:spcPts val="0"/>
-                        </a:spcAft>
-                        <a:buClrTx/>
-                        <a:buSzTx/>
-                        <a:buFontTx/>
-                        <a:buNone/>
-                        <a:tabLst/>
-                        <a:defRPr/>
-                      </a:pPr>
-                      <a:r>
-                        <a:rPr lang="en-US" dirty="0"/>
-                        <a:t>0x06</a:t>
-                      </a:r>
-                      <a:endParaRPr lang="en-CN" dirty="0"/>
-                    </a:p>
-                  </a:txBody>
-                  <a:tcPr/>
-                </a:tc>
-                <a:extLst>
-                  <a:ext uri="{0D108BD9-81ED-4DB2-BD59-A6C34878D82A}">
-                    <a16:rowId xmlns:a16="http://schemas.microsoft.com/office/drawing/2014/main" val="1586949569"/>
-                  </a:ext>
-                </a:extLst>
-              </a:tr>
-              <a:tr h="370840">
-                <a:tc>
-                  <a:txBody>
-                    <a:bodyPr/>
-                    <a:lstStyle/>
-                    <a:p>
-                      <a:pPr algn="ctr"/>
-                      <a:r>
-                        <a:rPr lang="en-US" altLang="zh-CN" dirty="0"/>
-                        <a:t>0x</a:t>
-                      </a:r>
-                      <a:r>
-                        <a:rPr lang="en-CN" dirty="0"/>
-                        <a:t>03</a:t>
-                      </a:r>
-                    </a:p>
-                  </a:txBody>
-                  <a:tcPr/>
-                </a:tc>
-                <a:tc>
-                  <a:txBody>
-                    <a:bodyPr/>
-                    <a:lstStyle/>
-                    <a:p>
-                      <a:pPr marL="0" marR="0" lvl="0" indent="0" algn="ctr" defTabSz="914400" rtl="0" eaLnBrk="1" fontAlgn="auto" latinLnBrk="0" hangingPunct="1">
-                        <a:lnSpc>
-                          <a:spcPct val="100000"/>
-                        </a:lnSpc>
-                        <a:spcBef>
-                          <a:spcPts val="0"/>
-                        </a:spcBef>
-                        <a:spcAft>
-                          <a:spcPts val="0"/>
-                        </a:spcAft>
-                        <a:buClrTx/>
-                        <a:buSzTx/>
-                        <a:buFontTx/>
-                        <a:buNone/>
-                        <a:tabLst/>
-                        <a:defRPr/>
-                      </a:pPr>
-                      <a:r>
-                        <a:rPr lang="en-US" dirty="0">
-                          <a:solidFill>
-                            <a:srgbClr val="FFC000"/>
-                          </a:solidFill>
-                        </a:rPr>
-                        <a:t>0x08</a:t>
-                      </a:r>
-                      <a:endParaRPr lang="en-CN" dirty="0">
-                        <a:solidFill>
-                          <a:srgbClr val="FFC000"/>
-                        </a:solidFill>
-                      </a:endParaRPr>
-                    </a:p>
-                  </a:txBody>
-                  <a:tcPr/>
-                </a:tc>
-                <a:extLst>
-                  <a:ext uri="{0D108BD9-81ED-4DB2-BD59-A6C34878D82A}">
-                    <a16:rowId xmlns:a16="http://schemas.microsoft.com/office/drawing/2014/main" val="3829265347"/>
-                  </a:ext>
-                </a:extLst>
-              </a:tr>
-              <a:tr h="370840">
-                <a:tc>
-                  <a:txBody>
-                    <a:bodyPr/>
-                    <a:lstStyle/>
-                    <a:p>
-                      <a:pPr algn="ctr"/>
-                      <a:r>
-                        <a:rPr lang="en-US" altLang="zh-CN" dirty="0"/>
-                        <a:t>0x</a:t>
-                      </a:r>
-                      <a:r>
-                        <a:rPr lang="en-CN" altLang="zh-CN" dirty="0"/>
-                        <a:t>04</a:t>
-                      </a:r>
-                      <a:endParaRPr lang="en-CN" dirty="0"/>
-                    </a:p>
-                  </a:txBody>
-                  <a:tcPr/>
-                </a:tc>
-                <a:tc>
-                  <a:txBody>
-                    <a:bodyPr/>
-                    <a:lstStyle/>
-                    <a:p>
-                      <a:pPr algn="ctr"/>
-                      <a:r>
-                        <a:rPr lang="en-US" altLang="zh-CN" dirty="0">
-                          <a:solidFill>
-                            <a:srgbClr val="FF0000"/>
-                          </a:solidFill>
-                        </a:rPr>
-                        <a:t>0x01</a:t>
-                      </a:r>
-                      <a:endParaRPr lang="en-CN" dirty="0">
-                        <a:solidFill>
-                          <a:srgbClr val="FF0000"/>
-                        </a:solidFill>
-                      </a:endParaRPr>
-                    </a:p>
-                  </a:txBody>
-                  <a:tcPr/>
-                </a:tc>
-                <a:extLst>
-                  <a:ext uri="{0D108BD9-81ED-4DB2-BD59-A6C34878D82A}">
-                    <a16:rowId xmlns:a16="http://schemas.microsoft.com/office/drawing/2014/main" val="3701478012"/>
-                  </a:ext>
-                </a:extLst>
-              </a:tr>
-              <a:tr h="370840">
-                <a:tc>
-                  <a:txBody>
-                    <a:bodyPr/>
-                    <a:lstStyle/>
-                    <a:p>
-                      <a:pPr algn="ctr"/>
-                      <a:r>
-                        <a:rPr lang="en-US" altLang="zh-CN" dirty="0"/>
-                        <a:t>0x</a:t>
-                      </a:r>
-                      <a:r>
-                        <a:rPr lang="en-CN" altLang="zh-CN" dirty="0"/>
-                        <a:t>05</a:t>
-                      </a:r>
-                      <a:endParaRPr lang="en-CN" dirty="0"/>
-                    </a:p>
-                  </a:txBody>
-                  <a:tcPr/>
-                </a:tc>
-                <a:tc>
-                  <a:txBody>
-                    <a:bodyPr/>
-                    <a:lstStyle/>
-                    <a:p>
-                      <a:pPr marL="0" marR="0" lvl="0" indent="0" algn="ctr" defTabSz="914400" rtl="0" eaLnBrk="1" fontAlgn="auto" latinLnBrk="0" hangingPunct="1">
-                        <a:lnSpc>
-                          <a:spcPct val="100000"/>
-                        </a:lnSpc>
-                        <a:spcBef>
-                          <a:spcPts val="0"/>
-                        </a:spcBef>
-                        <a:spcAft>
-                          <a:spcPts val="0"/>
-                        </a:spcAft>
-                        <a:buClrTx/>
-                        <a:buSzTx/>
-                        <a:buFontTx/>
-                        <a:buNone/>
-                        <a:tabLst/>
-                        <a:defRPr/>
-                      </a:pPr>
-                      <a:r>
-                        <a:rPr lang="en-US" dirty="0"/>
-                        <a:t>0x00</a:t>
-                      </a:r>
-                      <a:endParaRPr lang="en-CN" dirty="0"/>
-                    </a:p>
-                  </a:txBody>
-                  <a:tcPr/>
-                </a:tc>
-                <a:extLst>
-                  <a:ext uri="{0D108BD9-81ED-4DB2-BD59-A6C34878D82A}">
-                    <a16:rowId xmlns:a16="http://schemas.microsoft.com/office/drawing/2014/main" val="3505889409"/>
-                  </a:ext>
-                </a:extLst>
-              </a:tr>
-              <a:tr h="370840">
-                <a:tc>
-                  <a:txBody>
-                    <a:bodyPr/>
-                    <a:lstStyle/>
-                    <a:p>
-                      <a:pPr algn="ctr"/>
-                      <a:r>
-                        <a:rPr lang="en-US" altLang="zh-CN" dirty="0"/>
-                        <a:t>0x</a:t>
-                      </a:r>
-                      <a:r>
-                        <a:rPr lang="en-CN" altLang="zh-CN" dirty="0"/>
-                        <a:t>06</a:t>
-                      </a:r>
-                      <a:endParaRPr lang="en-CN" dirty="0"/>
-                    </a:p>
-                  </a:txBody>
-                  <a:tcPr/>
-                </a:tc>
-                <a:tc>
-                  <a:txBody>
-                    <a:bodyPr/>
-                    <a:lstStyle/>
-                    <a:p>
-                      <a:pPr marL="0" marR="0" lvl="0" indent="0" algn="ctr" defTabSz="914400" rtl="0" eaLnBrk="1" fontAlgn="auto" latinLnBrk="0" hangingPunct="1">
-                        <a:lnSpc>
-                          <a:spcPct val="100000"/>
-                        </a:lnSpc>
-                        <a:spcBef>
-                          <a:spcPts val="0"/>
-                        </a:spcBef>
-                        <a:spcAft>
-                          <a:spcPts val="0"/>
-                        </a:spcAft>
-                        <a:buClrTx/>
-                        <a:buSzTx/>
-                        <a:buFontTx/>
-                        <a:buNone/>
-                        <a:tabLst/>
-                        <a:defRPr/>
-                      </a:pPr>
-                      <a:r>
-                        <a:rPr lang="en-US" dirty="0"/>
-                        <a:t>0x00</a:t>
-                      </a:r>
-                      <a:endParaRPr lang="en-CN" dirty="0"/>
-                    </a:p>
-                  </a:txBody>
-                  <a:tcPr/>
-                </a:tc>
-                <a:extLst>
-                  <a:ext uri="{0D108BD9-81ED-4DB2-BD59-A6C34878D82A}">
-                    <a16:rowId xmlns:a16="http://schemas.microsoft.com/office/drawing/2014/main" val="2334802600"/>
-                  </a:ext>
-                </a:extLst>
-              </a:tr>
-              <a:tr h="370840">
-                <a:tc>
-                  <a:txBody>
-                    <a:bodyPr/>
-                    <a:lstStyle/>
-                    <a:p>
-                      <a:pPr algn="ctr"/>
-                      <a:r>
-                        <a:rPr lang="en-US" altLang="zh-CN" dirty="0"/>
-                        <a:t>0x</a:t>
-                      </a:r>
-                      <a:r>
-                        <a:rPr lang="en-CN" altLang="zh-CN" dirty="0"/>
-                        <a:t>07</a:t>
-                      </a:r>
-                      <a:endParaRPr lang="en-CN" dirty="0"/>
-                    </a:p>
-                  </a:txBody>
-                  <a:tcPr/>
-                </a:tc>
-                <a:tc>
-                  <a:txBody>
-                    <a:bodyPr/>
-                    <a:lstStyle/>
-                    <a:p>
-                      <a:pPr marL="0" marR="0" lvl="0" indent="0" algn="ctr" defTabSz="914400" rtl="0" eaLnBrk="1" fontAlgn="auto" latinLnBrk="0" hangingPunct="1">
-                        <a:lnSpc>
-                          <a:spcPct val="100000"/>
-                        </a:lnSpc>
-                        <a:spcBef>
-                          <a:spcPts val="0"/>
-                        </a:spcBef>
-                        <a:spcAft>
-                          <a:spcPts val="0"/>
-                        </a:spcAft>
-                        <a:buClrTx/>
-                        <a:buSzTx/>
-                        <a:buFontTx/>
-                        <a:buNone/>
-                        <a:tabLst/>
-                        <a:defRPr/>
-                      </a:pPr>
-                      <a:r>
-                        <a:rPr lang="en-US" dirty="0">
-                          <a:solidFill>
-                            <a:srgbClr val="FFC000"/>
-                          </a:solidFill>
-                        </a:rPr>
-                        <a:t>0x00</a:t>
-                      </a:r>
-                      <a:endParaRPr lang="en-CN" dirty="0">
-                        <a:solidFill>
-                          <a:srgbClr val="FFC000"/>
-                        </a:solidFill>
-                      </a:endParaRPr>
-                    </a:p>
-                  </a:txBody>
-                  <a:tcPr/>
-                </a:tc>
-                <a:extLst>
-                  <a:ext uri="{0D108BD9-81ED-4DB2-BD59-A6C34878D82A}">
-                    <a16:rowId xmlns:a16="http://schemas.microsoft.com/office/drawing/2014/main" val="3263919875"/>
-                  </a:ext>
-                </a:extLst>
-              </a:tr>
-              <a:tr h="370840">
-                <a:tc>
-                  <a:txBody>
-                    <a:bodyPr/>
-                    <a:lstStyle/>
-                    <a:p>
-                      <a:pPr algn="ctr"/>
-                      <a:r>
-                        <a:rPr lang="en-CN" dirty="0"/>
-                        <a:t>…</a:t>
-                      </a:r>
-                    </a:p>
-                  </a:txBody>
-                  <a:tcPr/>
-                </a:tc>
-                <a:tc>
-                  <a:txBody>
-                    <a:bodyPr/>
-                    <a:lstStyle/>
-                    <a:p>
-                      <a:pPr algn="ctr"/>
-                      <a:r>
-                        <a:rPr lang="en-CN" dirty="0"/>
-                        <a:t>…</a:t>
-                      </a:r>
-                    </a:p>
-                  </a:txBody>
-                  <a:tcPr/>
-                </a:tc>
-                <a:extLst>
-                  <a:ext uri="{0D108BD9-81ED-4DB2-BD59-A6C34878D82A}">
-                    <a16:rowId xmlns:a16="http://schemas.microsoft.com/office/drawing/2014/main" val="3544819921"/>
-                  </a:ext>
-                </a:extLst>
-              </a:tr>
-            </a:tbl>
-          </a:graphicData>
-        </a:graphic>
-      </p:graphicFrame>
-      <p:sp>
-        <p:nvSpPr>
-          <p:cNvPr id="4" name="Right Brace 3">
-            <a:extLst>
-              <a:ext uri="{FF2B5EF4-FFF2-40B4-BE49-F238E27FC236}">
-                <a16:creationId xmlns:a16="http://schemas.microsoft.com/office/drawing/2014/main" id="{396FA7D0-A59C-D344-D1CD-5FB2F9BE684D}"/>
-              </a:ext>
-            </a:extLst>
-          </p:cNvPr>
-          <p:cNvSpPr/>
-          <p:nvPr/>
-        </p:nvSpPr>
-        <p:spPr>
-          <a:xfrm>
-            <a:off x="4421275" y="1034980"/>
-            <a:ext cx="341644" cy="1376624"/>
-          </a:xfrm>
-          <a:prstGeom prst="rightBrace">
-            <a:avLst/>
-          </a:prstGeom>
-          <a:ln w="12700"/>
-        </p:spPr>
-        <p:style>
-          <a:lnRef idx="1">
-            <a:schemeClr val="accent1"/>
-          </a:lnRef>
-          <a:fillRef idx="0">
-            <a:schemeClr val="accent1"/>
-          </a:fillRef>
-          <a:effectRef idx="0">
-            <a:schemeClr val="accent1"/>
-          </a:effectRef>
-          <a:fontRef idx="minor">
-            <a:schemeClr val="tx1"/>
-          </a:fontRef>
-        </p:style>
-        <p:txBody>
-          <a:bodyPr rtlCol="0" anchor="ctr"/>
-          <a:lstStyle/>
-          <a:p>
-            <a:pPr algn="ctr"/>
-            <a:endParaRPr lang="en-CN" dirty="0">
-              <a:ln w="76200">
-                <a:solidFill>
-                  <a:schemeClr val="tx1"/>
-                </a:solidFill>
-              </a:ln>
-              <a:solidFill>
-                <a:sysClr val="windowText" lastClr="000000"/>
-              </a:solidFill>
-            </a:endParaRPr>
-          </a:p>
-        </p:txBody>
-      </p:sp>
-      <p:sp>
-        <p:nvSpPr>
-          <p:cNvPr id="5" name="Right Brace 4">
-            <a:extLst>
-              <a:ext uri="{FF2B5EF4-FFF2-40B4-BE49-F238E27FC236}">
-                <a16:creationId xmlns:a16="http://schemas.microsoft.com/office/drawing/2014/main" id="{0FFDF9BF-95E3-1C09-C579-92EFE28E972F}"/>
-              </a:ext>
-            </a:extLst>
-          </p:cNvPr>
-          <p:cNvSpPr/>
-          <p:nvPr/>
-        </p:nvSpPr>
-        <p:spPr>
-          <a:xfrm>
-            <a:off x="4421275" y="2572716"/>
-            <a:ext cx="341644" cy="1376624"/>
-          </a:xfrm>
-          <a:prstGeom prst="rightBrace">
-            <a:avLst/>
-          </a:prstGeom>
-          <a:ln w="12700"/>
-        </p:spPr>
-        <p:style>
-          <a:lnRef idx="1">
-            <a:schemeClr val="accent1"/>
-          </a:lnRef>
-          <a:fillRef idx="0">
-            <a:schemeClr val="accent1"/>
-          </a:fillRef>
-          <a:effectRef idx="0">
-            <a:schemeClr val="accent1"/>
-          </a:effectRef>
-          <a:fontRef idx="minor">
-            <a:schemeClr val="tx1"/>
-          </a:fontRef>
-        </p:style>
-        <p:txBody>
-          <a:bodyPr rtlCol="0" anchor="ctr"/>
-          <a:lstStyle/>
-          <a:p>
-            <a:pPr algn="ctr"/>
-            <a:endParaRPr lang="en-CN" dirty="0">
-              <a:ln w="76200">
-                <a:solidFill>
-                  <a:schemeClr val="tx1"/>
-                </a:solidFill>
-              </a:ln>
-              <a:solidFill>
-                <a:sysClr val="windowText" lastClr="000000"/>
-              </a:solidFill>
-            </a:endParaRPr>
-          </a:p>
-        </p:txBody>
-      </p:sp>
-      <p:sp>
-        <p:nvSpPr>
-          <p:cNvPr id="6" name="Rectangle 5">
-            <a:extLst>
-              <a:ext uri="{FF2B5EF4-FFF2-40B4-BE49-F238E27FC236}">
-                <a16:creationId xmlns:a16="http://schemas.microsoft.com/office/drawing/2014/main" id="{59C6D7BD-3DBB-FD3A-1D32-B0258B302B12}"/>
-              </a:ext>
-            </a:extLst>
-          </p:cNvPr>
-          <p:cNvSpPr/>
-          <p:nvPr/>
-        </p:nvSpPr>
-        <p:spPr>
-          <a:xfrm>
-            <a:off x="5245240" y="1215852"/>
-            <a:ext cx="1245995" cy="351693"/>
-          </a:xfrm>
-          <a:prstGeom prst="rect">
-            <a:avLst/>
-          </a:prstGeom>
-        </p:spPr>
-        <p:style>
-          <a:lnRef idx="2">
-            <a:schemeClr val="accent5"/>
-          </a:lnRef>
-          <a:fillRef idx="1">
-            <a:schemeClr val="lt1"/>
-          </a:fillRef>
-          <a:effectRef idx="0">
-            <a:schemeClr val="accent5"/>
-          </a:effectRef>
-          <a:fontRef idx="minor">
-            <a:schemeClr val="dk1"/>
-          </a:fontRef>
-        </p:style>
-        <p:txBody>
-          <a:bodyPr rtlCol="0" anchor="ctr"/>
-          <a:lstStyle/>
-          <a:p>
-            <a:pPr algn="ctr"/>
-            <a:r>
-              <a:rPr lang="en-CN" dirty="0">
-                <a:solidFill>
-                  <a:srgbClr val="FFC000"/>
-                </a:solidFill>
-              </a:rPr>
-              <a:t>00001000</a:t>
-            </a:r>
-          </a:p>
-        </p:txBody>
-      </p:sp>
-      <p:sp>
-        <p:nvSpPr>
-          <p:cNvPr id="7" name="Rectangle 6">
-            <a:extLst>
-              <a:ext uri="{FF2B5EF4-FFF2-40B4-BE49-F238E27FC236}">
-                <a16:creationId xmlns:a16="http://schemas.microsoft.com/office/drawing/2014/main" id="{3E30B29C-95A8-6A02-7198-268C6D914686}"/>
-              </a:ext>
-            </a:extLst>
-          </p:cNvPr>
-          <p:cNvSpPr/>
-          <p:nvPr/>
-        </p:nvSpPr>
-        <p:spPr>
-          <a:xfrm>
-            <a:off x="6491235" y="1215852"/>
-            <a:ext cx="1245995" cy="351693"/>
-          </a:xfrm>
-          <a:prstGeom prst="rect">
-            <a:avLst/>
-          </a:prstGeom>
-        </p:spPr>
-        <p:style>
-          <a:lnRef idx="2">
-            <a:schemeClr val="accent5"/>
-          </a:lnRef>
-          <a:fillRef idx="1">
-            <a:schemeClr val="lt1"/>
-          </a:fillRef>
-          <a:effectRef idx="0">
-            <a:schemeClr val="accent5"/>
-          </a:effectRef>
-          <a:fontRef idx="minor">
-            <a:schemeClr val="dk1"/>
-          </a:fontRef>
-        </p:style>
-        <p:txBody>
-          <a:bodyPr rtlCol="0" anchor="ctr"/>
-          <a:lstStyle/>
-          <a:p>
-            <a:pPr algn="ctr"/>
-            <a:r>
-              <a:rPr lang="en-CN" dirty="0"/>
-              <a:t>00000110</a:t>
-            </a:r>
-          </a:p>
-        </p:txBody>
-      </p:sp>
-      <p:sp>
-        <p:nvSpPr>
-          <p:cNvPr id="8" name="Rectangle 7">
-            <a:extLst>
-              <a:ext uri="{FF2B5EF4-FFF2-40B4-BE49-F238E27FC236}">
-                <a16:creationId xmlns:a16="http://schemas.microsoft.com/office/drawing/2014/main" id="{10E43B65-5134-1D47-1711-A07F9C08705A}"/>
-              </a:ext>
-            </a:extLst>
-          </p:cNvPr>
-          <p:cNvSpPr/>
-          <p:nvPr/>
-        </p:nvSpPr>
-        <p:spPr>
-          <a:xfrm>
-            <a:off x="7737230" y="1215851"/>
-            <a:ext cx="1245995" cy="351693"/>
-          </a:xfrm>
-          <a:prstGeom prst="rect">
-            <a:avLst/>
-          </a:prstGeom>
-        </p:spPr>
-        <p:style>
-          <a:lnRef idx="2">
-            <a:schemeClr val="accent5"/>
-          </a:lnRef>
-          <a:fillRef idx="1">
-            <a:schemeClr val="lt1"/>
-          </a:fillRef>
-          <a:effectRef idx="0">
-            <a:schemeClr val="accent5"/>
-          </a:effectRef>
-          <a:fontRef idx="minor">
-            <a:schemeClr val="dk1"/>
-          </a:fontRef>
-        </p:style>
-        <p:txBody>
-          <a:bodyPr rtlCol="0" anchor="ctr"/>
-          <a:lstStyle/>
-          <a:p>
-            <a:pPr algn="ctr"/>
-            <a:r>
-              <a:rPr lang="en-CN" dirty="0"/>
-              <a:t>00000010</a:t>
-            </a:r>
-          </a:p>
-        </p:txBody>
-      </p:sp>
-      <p:sp>
-        <p:nvSpPr>
-          <p:cNvPr id="9" name="Rectangle 8">
-            <a:extLst>
-              <a:ext uri="{FF2B5EF4-FFF2-40B4-BE49-F238E27FC236}">
-                <a16:creationId xmlns:a16="http://schemas.microsoft.com/office/drawing/2014/main" id="{553706DC-DDDB-18CC-68B1-FF57309EEA65}"/>
-              </a:ext>
-            </a:extLst>
-          </p:cNvPr>
-          <p:cNvSpPr/>
-          <p:nvPr/>
-        </p:nvSpPr>
-        <p:spPr>
-          <a:xfrm>
-            <a:off x="8983225" y="1215850"/>
-            <a:ext cx="1245995" cy="351693"/>
-          </a:xfrm>
-          <a:prstGeom prst="rect">
-            <a:avLst/>
-          </a:prstGeom>
-        </p:spPr>
-        <p:style>
-          <a:lnRef idx="2">
-            <a:schemeClr val="accent5"/>
-          </a:lnRef>
-          <a:fillRef idx="1">
-            <a:schemeClr val="lt1"/>
-          </a:fillRef>
-          <a:effectRef idx="0">
-            <a:schemeClr val="accent5"/>
-          </a:effectRef>
-          <a:fontRef idx="minor">
-            <a:schemeClr val="dk1"/>
-          </a:fontRef>
-        </p:style>
-        <p:txBody>
-          <a:bodyPr rtlCol="0" anchor="ctr"/>
-          <a:lstStyle/>
-          <a:p>
-            <a:pPr algn="ctr"/>
-            <a:r>
-              <a:rPr lang="en-CN" dirty="0">
-                <a:solidFill>
-                  <a:srgbClr val="FF0000"/>
-                </a:solidFill>
-              </a:rPr>
-              <a:t>00000001</a:t>
-            </a:r>
-          </a:p>
-        </p:txBody>
-      </p:sp>
-      <p:sp>
-        <p:nvSpPr>
-          <p:cNvPr id="10" name="TextBox 9">
-            <a:extLst>
-              <a:ext uri="{FF2B5EF4-FFF2-40B4-BE49-F238E27FC236}">
-                <a16:creationId xmlns:a16="http://schemas.microsoft.com/office/drawing/2014/main" id="{3E928B10-B552-7C4A-D946-643202D2689A}"/>
-              </a:ext>
-            </a:extLst>
-          </p:cNvPr>
-          <p:cNvSpPr txBox="1"/>
-          <p:nvPr/>
-        </p:nvSpPr>
-        <p:spPr>
-          <a:xfrm>
-            <a:off x="5524769" y="856563"/>
-            <a:ext cx="686936" cy="369332"/>
-          </a:xfrm>
-          <a:prstGeom prst="rect">
-            <a:avLst/>
-          </a:prstGeom>
-          <a:noFill/>
-        </p:spPr>
-        <p:txBody>
-          <a:bodyPr wrap="square" rtlCol="0">
-            <a:spAutoFit/>
-          </a:bodyPr>
-          <a:lstStyle/>
-          <a:p>
-            <a:r>
-              <a:rPr lang="en-CN" dirty="0">
-                <a:ln w="0"/>
-                <a:solidFill>
-                  <a:schemeClr val="accent1"/>
-                </a:solidFill>
-                <a:effectLst>
-                  <a:outerShdw blurRad="38100" dist="25400" dir="5400000" algn="ctr" rotWithShape="0">
-                    <a:srgbClr val="6E747A">
-                      <a:alpha val="43000"/>
-                    </a:srgbClr>
-                  </a:outerShdw>
-                </a:effectLst>
-              </a:rPr>
-              <a:t>[000]</a:t>
-            </a:r>
-          </a:p>
-        </p:txBody>
-      </p:sp>
-      <p:sp>
-        <p:nvSpPr>
-          <p:cNvPr id="11" name="TextBox 10">
-            <a:extLst>
-              <a:ext uri="{FF2B5EF4-FFF2-40B4-BE49-F238E27FC236}">
-                <a16:creationId xmlns:a16="http://schemas.microsoft.com/office/drawing/2014/main" id="{25DAACA8-6DDD-B205-DCE1-72E6CA6E4C50}"/>
-              </a:ext>
-            </a:extLst>
-          </p:cNvPr>
-          <p:cNvSpPr txBox="1"/>
-          <p:nvPr/>
-        </p:nvSpPr>
-        <p:spPr>
-          <a:xfrm>
-            <a:off x="6770764" y="856563"/>
-            <a:ext cx="686936" cy="369332"/>
-          </a:xfrm>
-          <a:prstGeom prst="rect">
-            <a:avLst/>
-          </a:prstGeom>
-          <a:noFill/>
-        </p:spPr>
-        <p:txBody>
-          <a:bodyPr wrap="square" rtlCol="0">
-            <a:spAutoFit/>
-          </a:bodyPr>
-          <a:lstStyle/>
-          <a:p>
-            <a:r>
-              <a:rPr lang="en-CN" dirty="0">
-                <a:ln w="0"/>
-                <a:solidFill>
-                  <a:schemeClr val="accent1"/>
-                </a:solidFill>
-                <a:effectLst>
-                  <a:outerShdw blurRad="38100" dist="25400" dir="5400000" algn="ctr" rotWithShape="0">
-                    <a:srgbClr val="6E747A">
-                      <a:alpha val="43000"/>
-                    </a:srgbClr>
-                  </a:outerShdw>
-                </a:effectLst>
-              </a:rPr>
-              <a:t>[001]</a:t>
-            </a:r>
-          </a:p>
-        </p:txBody>
-      </p:sp>
-      <p:sp>
-        <p:nvSpPr>
-          <p:cNvPr id="12" name="TextBox 11">
-            <a:extLst>
-              <a:ext uri="{FF2B5EF4-FFF2-40B4-BE49-F238E27FC236}">
-                <a16:creationId xmlns:a16="http://schemas.microsoft.com/office/drawing/2014/main" id="{22911C81-90D8-2CF7-1C17-BE102EA05B36}"/>
-              </a:ext>
-            </a:extLst>
-          </p:cNvPr>
-          <p:cNvSpPr txBox="1"/>
-          <p:nvPr/>
-        </p:nvSpPr>
-        <p:spPr>
-          <a:xfrm>
-            <a:off x="8016759" y="856563"/>
-            <a:ext cx="686936" cy="369332"/>
-          </a:xfrm>
-          <a:prstGeom prst="rect">
-            <a:avLst/>
-          </a:prstGeom>
-          <a:noFill/>
-        </p:spPr>
-        <p:txBody>
-          <a:bodyPr wrap="square" rtlCol="0">
-            <a:spAutoFit/>
-          </a:bodyPr>
-          <a:lstStyle/>
-          <a:p>
-            <a:r>
-              <a:rPr lang="en-CN" dirty="0">
-                <a:ln w="0"/>
-                <a:solidFill>
-                  <a:schemeClr val="accent1"/>
-                </a:solidFill>
-                <a:effectLst>
-                  <a:outerShdw blurRad="38100" dist="25400" dir="5400000" algn="ctr" rotWithShape="0">
-                    <a:srgbClr val="6E747A">
-                      <a:alpha val="43000"/>
-                    </a:srgbClr>
-                  </a:outerShdw>
-                </a:effectLst>
-              </a:rPr>
-              <a:t>[010]</a:t>
-            </a:r>
-          </a:p>
-        </p:txBody>
-      </p:sp>
-      <p:sp>
-        <p:nvSpPr>
-          <p:cNvPr id="13" name="TextBox 12">
-            <a:extLst>
-              <a:ext uri="{FF2B5EF4-FFF2-40B4-BE49-F238E27FC236}">
-                <a16:creationId xmlns:a16="http://schemas.microsoft.com/office/drawing/2014/main" id="{CB224847-EAEB-E79C-050E-281A6C00E370}"/>
-              </a:ext>
-            </a:extLst>
-          </p:cNvPr>
-          <p:cNvSpPr txBox="1"/>
-          <p:nvPr/>
-        </p:nvSpPr>
-        <p:spPr>
-          <a:xfrm>
-            <a:off x="9262754" y="846517"/>
-            <a:ext cx="686936" cy="369332"/>
-          </a:xfrm>
-          <a:prstGeom prst="rect">
-            <a:avLst/>
-          </a:prstGeom>
-          <a:noFill/>
-        </p:spPr>
-        <p:txBody>
-          <a:bodyPr wrap="square" rtlCol="0">
-            <a:spAutoFit/>
-          </a:bodyPr>
-          <a:lstStyle/>
-          <a:p>
-            <a:r>
-              <a:rPr lang="en-CN" dirty="0">
-                <a:ln w="0"/>
-                <a:solidFill>
-                  <a:schemeClr val="accent1"/>
-                </a:solidFill>
-                <a:effectLst>
-                  <a:outerShdw blurRad="38100" dist="25400" dir="5400000" algn="ctr" rotWithShape="0">
-                    <a:srgbClr val="6E747A">
-                      <a:alpha val="43000"/>
-                    </a:srgbClr>
-                  </a:outerShdw>
-                </a:effectLst>
-              </a:rPr>
-              <a:t>[011]</a:t>
-            </a:r>
-          </a:p>
-        </p:txBody>
-      </p:sp>
-      <p:sp>
-        <p:nvSpPr>
-          <p:cNvPr id="14" name="Down Arrow 13">
-            <a:extLst>
-              <a:ext uri="{FF2B5EF4-FFF2-40B4-BE49-F238E27FC236}">
-                <a16:creationId xmlns:a16="http://schemas.microsoft.com/office/drawing/2014/main" id="{226A20E8-118B-9FDF-48B4-60B2B13B6775}"/>
-              </a:ext>
-            </a:extLst>
-          </p:cNvPr>
-          <p:cNvSpPr/>
-          <p:nvPr/>
-        </p:nvSpPr>
-        <p:spPr>
-          <a:xfrm>
-            <a:off x="7416594" y="1673052"/>
-            <a:ext cx="641271" cy="286378"/>
-          </a:xfrm>
-          <a:prstGeom prst="downArrow">
-            <a:avLst/>
-          </a:prstGeom>
-        </p:spPr>
-        <p:style>
-          <a:lnRef idx="1">
-            <a:schemeClr val="accent1"/>
-          </a:lnRef>
-          <a:fillRef idx="2">
-            <a:schemeClr val="accent1"/>
-          </a:fillRef>
-          <a:effectRef idx="1">
-            <a:schemeClr val="accent1"/>
-          </a:effectRef>
-          <a:fontRef idx="minor">
-            <a:schemeClr val="dk1"/>
-          </a:fontRef>
-        </p:style>
-        <p:txBody>
-          <a:bodyPr rtlCol="0" anchor="ctr"/>
-          <a:lstStyle/>
-          <a:p>
-            <a:pPr algn="ctr"/>
-            <a:endParaRPr lang="en-CN"/>
-          </a:p>
-        </p:txBody>
-      </p:sp>
-      <p:sp>
-        <p:nvSpPr>
-          <p:cNvPr id="15" name="TextBox 14">
-            <a:extLst>
-              <a:ext uri="{FF2B5EF4-FFF2-40B4-BE49-F238E27FC236}">
-                <a16:creationId xmlns:a16="http://schemas.microsoft.com/office/drawing/2014/main" id="{ACF154DA-2FFB-4DE4-3F99-1F3FF8B06B25}"/>
-              </a:ext>
-            </a:extLst>
-          </p:cNvPr>
-          <p:cNvSpPr txBox="1"/>
-          <p:nvPr/>
-        </p:nvSpPr>
-        <p:spPr>
-          <a:xfrm>
-            <a:off x="7099946" y="2074986"/>
-            <a:ext cx="1260281" cy="369332"/>
-          </a:xfrm>
-          <a:prstGeom prst="rect">
-            <a:avLst/>
-          </a:prstGeom>
-          <a:noFill/>
-        </p:spPr>
-        <p:txBody>
-          <a:bodyPr wrap="none" rtlCol="0">
-            <a:spAutoFit/>
-          </a:bodyPr>
-          <a:lstStyle/>
-          <a:p>
-            <a:r>
-              <a:rPr lang="en-CN" dirty="0"/>
-              <a:t>0x8060201</a:t>
-            </a:r>
-          </a:p>
-        </p:txBody>
-      </p:sp>
-      <p:sp>
-        <p:nvSpPr>
-          <p:cNvPr id="58" name="Rectangle 57">
-            <a:extLst>
-              <a:ext uri="{FF2B5EF4-FFF2-40B4-BE49-F238E27FC236}">
-                <a16:creationId xmlns:a16="http://schemas.microsoft.com/office/drawing/2014/main" id="{3149DC43-5AB0-1EEC-96CB-C10C4F5B57D8}"/>
-              </a:ext>
-            </a:extLst>
-          </p:cNvPr>
-          <p:cNvSpPr/>
-          <p:nvPr/>
-        </p:nvSpPr>
-        <p:spPr>
-          <a:xfrm>
-            <a:off x="5245240" y="2705802"/>
-            <a:ext cx="1245995" cy="351693"/>
-          </a:xfrm>
-          <a:prstGeom prst="rect">
-            <a:avLst/>
-          </a:prstGeom>
-        </p:spPr>
-        <p:style>
-          <a:lnRef idx="2">
-            <a:schemeClr val="accent5"/>
-          </a:lnRef>
-          <a:fillRef idx="1">
-            <a:schemeClr val="lt1"/>
-          </a:fillRef>
-          <a:effectRef idx="0">
-            <a:schemeClr val="accent5"/>
-          </a:effectRef>
-          <a:fontRef idx="minor">
-            <a:schemeClr val="dk1"/>
-          </a:fontRef>
-        </p:style>
-        <p:txBody>
-          <a:bodyPr rtlCol="0" anchor="ctr"/>
-          <a:lstStyle/>
-          <a:p>
-            <a:pPr algn="ctr"/>
-            <a:r>
-              <a:rPr lang="en-CN" dirty="0">
-                <a:solidFill>
-                  <a:srgbClr val="FFC000"/>
-                </a:solidFill>
-              </a:rPr>
-              <a:t>0000</a:t>
-            </a:r>
-            <a:r>
-              <a:rPr lang="en-US" altLang="zh-CN" dirty="0">
-                <a:solidFill>
-                  <a:srgbClr val="FFC000"/>
-                </a:solidFill>
-              </a:rPr>
-              <a:t>0</a:t>
-            </a:r>
-            <a:r>
-              <a:rPr lang="en-CN" dirty="0">
-                <a:solidFill>
-                  <a:srgbClr val="FFC000"/>
-                </a:solidFill>
-              </a:rPr>
-              <a:t>000</a:t>
-            </a:r>
-          </a:p>
-        </p:txBody>
-      </p:sp>
-      <p:sp>
-        <p:nvSpPr>
-          <p:cNvPr id="59" name="Rectangle 58">
-            <a:extLst>
-              <a:ext uri="{FF2B5EF4-FFF2-40B4-BE49-F238E27FC236}">
-                <a16:creationId xmlns:a16="http://schemas.microsoft.com/office/drawing/2014/main" id="{7ECDE663-37D5-1938-1659-DE3CE3DB760D}"/>
-              </a:ext>
-            </a:extLst>
-          </p:cNvPr>
-          <p:cNvSpPr/>
-          <p:nvPr/>
-        </p:nvSpPr>
-        <p:spPr>
-          <a:xfrm>
-            <a:off x="6491235" y="2705802"/>
-            <a:ext cx="1245995" cy="351693"/>
-          </a:xfrm>
-          <a:prstGeom prst="rect">
-            <a:avLst/>
-          </a:prstGeom>
-        </p:spPr>
-        <p:style>
-          <a:lnRef idx="2">
-            <a:schemeClr val="accent5"/>
-          </a:lnRef>
-          <a:fillRef idx="1">
-            <a:schemeClr val="lt1"/>
-          </a:fillRef>
-          <a:effectRef idx="0">
-            <a:schemeClr val="accent5"/>
-          </a:effectRef>
-          <a:fontRef idx="minor">
-            <a:schemeClr val="dk1"/>
-          </a:fontRef>
-        </p:style>
-        <p:txBody>
-          <a:bodyPr rtlCol="0" anchor="ctr"/>
-          <a:lstStyle/>
-          <a:p>
-            <a:pPr algn="ctr"/>
-            <a:r>
-              <a:rPr lang="en-CN" dirty="0"/>
-              <a:t>00000</a:t>
-            </a:r>
-            <a:r>
-              <a:rPr lang="en-US" altLang="zh-CN" dirty="0"/>
-              <a:t>00</a:t>
-            </a:r>
-            <a:r>
-              <a:rPr lang="en-CN" dirty="0"/>
-              <a:t>0</a:t>
-            </a:r>
-          </a:p>
-        </p:txBody>
-      </p:sp>
-      <p:sp>
-        <p:nvSpPr>
-          <p:cNvPr id="60" name="Rectangle 59">
-            <a:extLst>
-              <a:ext uri="{FF2B5EF4-FFF2-40B4-BE49-F238E27FC236}">
-                <a16:creationId xmlns:a16="http://schemas.microsoft.com/office/drawing/2014/main" id="{41BB8235-2EF9-83D6-5269-711C47084B1B}"/>
-              </a:ext>
-            </a:extLst>
-          </p:cNvPr>
-          <p:cNvSpPr/>
-          <p:nvPr/>
-        </p:nvSpPr>
-        <p:spPr>
-          <a:xfrm>
-            <a:off x="7737230" y="2705801"/>
-            <a:ext cx="1245995" cy="351693"/>
-          </a:xfrm>
-          <a:prstGeom prst="rect">
-            <a:avLst/>
-          </a:prstGeom>
-        </p:spPr>
-        <p:style>
-          <a:lnRef idx="2">
-            <a:schemeClr val="accent5"/>
-          </a:lnRef>
-          <a:fillRef idx="1">
-            <a:schemeClr val="lt1"/>
-          </a:fillRef>
-          <a:effectRef idx="0">
-            <a:schemeClr val="accent5"/>
-          </a:effectRef>
-          <a:fontRef idx="minor">
-            <a:schemeClr val="dk1"/>
-          </a:fontRef>
-        </p:style>
-        <p:txBody>
-          <a:bodyPr rtlCol="0" anchor="ctr"/>
-          <a:lstStyle/>
-          <a:p>
-            <a:pPr algn="ctr"/>
-            <a:r>
-              <a:rPr lang="en-CN" dirty="0"/>
-              <a:t>000000</a:t>
-            </a:r>
-            <a:r>
-              <a:rPr lang="en-US" altLang="zh-CN" dirty="0"/>
-              <a:t>0</a:t>
-            </a:r>
-            <a:r>
-              <a:rPr lang="en-CN" dirty="0"/>
-              <a:t>0</a:t>
-            </a:r>
-          </a:p>
-        </p:txBody>
-      </p:sp>
-      <p:sp>
-        <p:nvSpPr>
-          <p:cNvPr id="61" name="Rectangle 60">
-            <a:extLst>
-              <a:ext uri="{FF2B5EF4-FFF2-40B4-BE49-F238E27FC236}">
-                <a16:creationId xmlns:a16="http://schemas.microsoft.com/office/drawing/2014/main" id="{89AB65A7-2B76-A439-BE34-5CE624E7DF6E}"/>
-              </a:ext>
-            </a:extLst>
-          </p:cNvPr>
-          <p:cNvSpPr/>
-          <p:nvPr/>
-        </p:nvSpPr>
-        <p:spPr>
-          <a:xfrm>
-            <a:off x="8983225" y="2705800"/>
-            <a:ext cx="1245995" cy="351693"/>
-          </a:xfrm>
-          <a:prstGeom prst="rect">
-            <a:avLst/>
-          </a:prstGeom>
-        </p:spPr>
-        <p:style>
-          <a:lnRef idx="2">
-            <a:schemeClr val="accent5"/>
-          </a:lnRef>
-          <a:fillRef idx="1">
-            <a:schemeClr val="lt1"/>
-          </a:fillRef>
-          <a:effectRef idx="0">
-            <a:schemeClr val="accent5"/>
-          </a:effectRef>
-          <a:fontRef idx="minor">
-            <a:schemeClr val="dk1"/>
-          </a:fontRef>
-        </p:style>
-        <p:txBody>
-          <a:bodyPr rtlCol="0" anchor="ctr"/>
-          <a:lstStyle/>
-          <a:p>
-            <a:pPr algn="ctr"/>
-            <a:r>
-              <a:rPr lang="en-CN" dirty="0">
-                <a:solidFill>
-                  <a:srgbClr val="FF0000"/>
-                </a:solidFill>
-              </a:rPr>
-              <a:t>00000001</a:t>
-            </a:r>
-          </a:p>
-        </p:txBody>
-      </p:sp>
-      <p:sp>
-        <p:nvSpPr>
-          <p:cNvPr id="62" name="TextBox 61">
-            <a:extLst>
-              <a:ext uri="{FF2B5EF4-FFF2-40B4-BE49-F238E27FC236}">
-                <a16:creationId xmlns:a16="http://schemas.microsoft.com/office/drawing/2014/main" id="{2AE113A7-33EC-8C6D-68BA-C28D12B2FC04}"/>
-              </a:ext>
-            </a:extLst>
-          </p:cNvPr>
-          <p:cNvSpPr txBox="1"/>
-          <p:nvPr/>
-        </p:nvSpPr>
-        <p:spPr>
-          <a:xfrm>
-            <a:off x="5524769" y="2346513"/>
-            <a:ext cx="686936" cy="369332"/>
-          </a:xfrm>
-          <a:prstGeom prst="rect">
-            <a:avLst/>
-          </a:prstGeom>
-          <a:noFill/>
-        </p:spPr>
-        <p:txBody>
-          <a:bodyPr wrap="square" rtlCol="0">
-            <a:spAutoFit/>
-          </a:bodyPr>
-          <a:lstStyle/>
-          <a:p>
-            <a:r>
-              <a:rPr lang="en-CN" dirty="0">
-                <a:ln w="0"/>
-                <a:solidFill>
-                  <a:schemeClr val="accent1"/>
-                </a:solidFill>
-                <a:effectLst>
-                  <a:outerShdw blurRad="38100" dist="25400" dir="5400000" algn="ctr" rotWithShape="0">
-                    <a:srgbClr val="6E747A">
-                      <a:alpha val="43000"/>
-                    </a:srgbClr>
-                  </a:outerShdw>
-                </a:effectLst>
-              </a:rPr>
-              <a:t>[</a:t>
-            </a:r>
-            <a:r>
-              <a:rPr lang="en-US" altLang="zh-CN" dirty="0">
-                <a:ln w="0"/>
-                <a:solidFill>
-                  <a:schemeClr val="accent1"/>
-                </a:solidFill>
-                <a:effectLst>
-                  <a:outerShdw blurRad="38100" dist="25400" dir="5400000" algn="ctr" rotWithShape="0">
-                    <a:srgbClr val="6E747A">
-                      <a:alpha val="43000"/>
-                    </a:srgbClr>
-                  </a:outerShdw>
-                </a:effectLst>
-              </a:rPr>
-              <a:t>1</a:t>
-            </a:r>
-            <a:r>
-              <a:rPr lang="en-CN" dirty="0">
-                <a:ln w="0"/>
-                <a:solidFill>
-                  <a:schemeClr val="accent1"/>
-                </a:solidFill>
-                <a:effectLst>
-                  <a:outerShdw blurRad="38100" dist="25400" dir="5400000" algn="ctr" rotWithShape="0">
-                    <a:srgbClr val="6E747A">
-                      <a:alpha val="43000"/>
-                    </a:srgbClr>
-                  </a:outerShdw>
-                </a:effectLst>
-              </a:rPr>
-              <a:t>00]</a:t>
-            </a:r>
-          </a:p>
-        </p:txBody>
-      </p:sp>
-      <p:sp>
-        <p:nvSpPr>
-          <p:cNvPr id="63" name="TextBox 62">
-            <a:extLst>
-              <a:ext uri="{FF2B5EF4-FFF2-40B4-BE49-F238E27FC236}">
-                <a16:creationId xmlns:a16="http://schemas.microsoft.com/office/drawing/2014/main" id="{1A64E053-6683-574C-DC82-46352D0AC0E4}"/>
-              </a:ext>
-            </a:extLst>
-          </p:cNvPr>
-          <p:cNvSpPr txBox="1"/>
-          <p:nvPr/>
-        </p:nvSpPr>
-        <p:spPr>
-          <a:xfrm>
-            <a:off x="6770764" y="2346513"/>
-            <a:ext cx="686936" cy="369332"/>
-          </a:xfrm>
-          <a:prstGeom prst="rect">
-            <a:avLst/>
-          </a:prstGeom>
-          <a:noFill/>
-        </p:spPr>
-        <p:txBody>
-          <a:bodyPr wrap="square" rtlCol="0">
-            <a:spAutoFit/>
-          </a:bodyPr>
-          <a:lstStyle/>
-          <a:p>
-            <a:r>
-              <a:rPr lang="en-CN" dirty="0">
-                <a:ln w="0"/>
-                <a:solidFill>
-                  <a:schemeClr val="accent1"/>
-                </a:solidFill>
-                <a:effectLst>
-                  <a:outerShdw blurRad="38100" dist="25400" dir="5400000" algn="ctr" rotWithShape="0">
-                    <a:srgbClr val="6E747A">
-                      <a:alpha val="43000"/>
-                    </a:srgbClr>
-                  </a:outerShdw>
-                </a:effectLst>
-              </a:rPr>
-              <a:t>[</a:t>
-            </a:r>
-            <a:r>
-              <a:rPr lang="en-US" altLang="zh-CN" dirty="0">
-                <a:ln w="0"/>
-                <a:solidFill>
-                  <a:schemeClr val="accent1"/>
-                </a:solidFill>
-                <a:effectLst>
-                  <a:outerShdw blurRad="38100" dist="25400" dir="5400000" algn="ctr" rotWithShape="0">
-                    <a:srgbClr val="6E747A">
-                      <a:alpha val="43000"/>
-                    </a:srgbClr>
-                  </a:outerShdw>
-                </a:effectLst>
-              </a:rPr>
-              <a:t>1</a:t>
-            </a:r>
-            <a:r>
-              <a:rPr lang="en-CN" dirty="0">
-                <a:ln w="0"/>
-                <a:solidFill>
-                  <a:schemeClr val="accent1"/>
-                </a:solidFill>
-                <a:effectLst>
-                  <a:outerShdw blurRad="38100" dist="25400" dir="5400000" algn="ctr" rotWithShape="0">
-                    <a:srgbClr val="6E747A">
-                      <a:alpha val="43000"/>
-                    </a:srgbClr>
-                  </a:outerShdw>
-                </a:effectLst>
-              </a:rPr>
-              <a:t>01]</a:t>
-            </a:r>
-          </a:p>
-        </p:txBody>
-      </p:sp>
-      <p:sp>
-        <p:nvSpPr>
-          <p:cNvPr id="64" name="TextBox 63">
-            <a:extLst>
-              <a:ext uri="{FF2B5EF4-FFF2-40B4-BE49-F238E27FC236}">
-                <a16:creationId xmlns:a16="http://schemas.microsoft.com/office/drawing/2014/main" id="{A336CAEE-19C0-7079-ADFD-485F127DAEA5}"/>
-              </a:ext>
-            </a:extLst>
-          </p:cNvPr>
-          <p:cNvSpPr txBox="1"/>
-          <p:nvPr/>
-        </p:nvSpPr>
-        <p:spPr>
-          <a:xfrm>
-            <a:off x="8016759" y="2346513"/>
-            <a:ext cx="686936" cy="369332"/>
-          </a:xfrm>
-          <a:prstGeom prst="rect">
-            <a:avLst/>
-          </a:prstGeom>
-          <a:noFill/>
-        </p:spPr>
-        <p:txBody>
-          <a:bodyPr wrap="square" rtlCol="0">
-            <a:spAutoFit/>
-          </a:bodyPr>
-          <a:lstStyle/>
-          <a:p>
-            <a:r>
-              <a:rPr lang="en-CN" dirty="0">
-                <a:ln w="0"/>
-                <a:solidFill>
-                  <a:schemeClr val="accent1"/>
-                </a:solidFill>
-                <a:effectLst>
-                  <a:outerShdw blurRad="38100" dist="25400" dir="5400000" algn="ctr" rotWithShape="0">
-                    <a:srgbClr val="6E747A">
-                      <a:alpha val="43000"/>
-                    </a:srgbClr>
-                  </a:outerShdw>
-                </a:effectLst>
-              </a:rPr>
-              <a:t>[</a:t>
-            </a:r>
-            <a:r>
-              <a:rPr lang="en-US" altLang="zh-CN" dirty="0">
-                <a:ln w="0"/>
-                <a:solidFill>
-                  <a:schemeClr val="accent1"/>
-                </a:solidFill>
-                <a:effectLst>
-                  <a:outerShdw blurRad="38100" dist="25400" dir="5400000" algn="ctr" rotWithShape="0">
-                    <a:srgbClr val="6E747A">
-                      <a:alpha val="43000"/>
-                    </a:srgbClr>
-                  </a:outerShdw>
-                </a:effectLst>
-              </a:rPr>
-              <a:t>1</a:t>
-            </a:r>
-            <a:r>
-              <a:rPr lang="en-CN" dirty="0">
-                <a:ln w="0"/>
-                <a:solidFill>
-                  <a:schemeClr val="accent1"/>
-                </a:solidFill>
-                <a:effectLst>
-                  <a:outerShdw blurRad="38100" dist="25400" dir="5400000" algn="ctr" rotWithShape="0">
-                    <a:srgbClr val="6E747A">
-                      <a:alpha val="43000"/>
-                    </a:srgbClr>
-                  </a:outerShdw>
-                </a:effectLst>
-              </a:rPr>
-              <a:t>10]</a:t>
-            </a:r>
-          </a:p>
-        </p:txBody>
-      </p:sp>
-      <p:sp>
-        <p:nvSpPr>
-          <p:cNvPr id="65" name="TextBox 64">
-            <a:extLst>
-              <a:ext uri="{FF2B5EF4-FFF2-40B4-BE49-F238E27FC236}">
-                <a16:creationId xmlns:a16="http://schemas.microsoft.com/office/drawing/2014/main" id="{F93BF485-7494-7D9D-FF21-DD61D5D7968B}"/>
-              </a:ext>
-            </a:extLst>
-          </p:cNvPr>
-          <p:cNvSpPr txBox="1"/>
-          <p:nvPr/>
-        </p:nvSpPr>
-        <p:spPr>
-          <a:xfrm>
-            <a:off x="9262754" y="2336467"/>
-            <a:ext cx="686936" cy="369332"/>
-          </a:xfrm>
-          <a:prstGeom prst="rect">
-            <a:avLst/>
-          </a:prstGeom>
-          <a:noFill/>
-        </p:spPr>
-        <p:txBody>
-          <a:bodyPr wrap="square" rtlCol="0">
-            <a:spAutoFit/>
-          </a:bodyPr>
-          <a:lstStyle/>
-          <a:p>
-            <a:r>
-              <a:rPr lang="en-CN" dirty="0">
-                <a:ln w="0"/>
-                <a:solidFill>
-                  <a:schemeClr val="accent1"/>
-                </a:solidFill>
-                <a:effectLst>
-                  <a:outerShdw blurRad="38100" dist="25400" dir="5400000" algn="ctr" rotWithShape="0">
-                    <a:srgbClr val="6E747A">
-                      <a:alpha val="43000"/>
-                    </a:srgbClr>
-                  </a:outerShdw>
-                </a:effectLst>
-              </a:rPr>
-              <a:t>[</a:t>
-            </a:r>
-            <a:r>
-              <a:rPr lang="en-US" altLang="zh-CN" dirty="0">
-                <a:ln w="0"/>
-                <a:solidFill>
-                  <a:schemeClr val="accent1"/>
-                </a:solidFill>
-                <a:effectLst>
-                  <a:outerShdw blurRad="38100" dist="25400" dir="5400000" algn="ctr" rotWithShape="0">
-                    <a:srgbClr val="6E747A">
-                      <a:alpha val="43000"/>
-                    </a:srgbClr>
-                  </a:outerShdw>
-                </a:effectLst>
-              </a:rPr>
-              <a:t>1</a:t>
-            </a:r>
-            <a:r>
-              <a:rPr lang="en-CN" dirty="0">
-                <a:ln w="0"/>
-                <a:solidFill>
-                  <a:schemeClr val="accent1"/>
-                </a:solidFill>
-                <a:effectLst>
-                  <a:outerShdw blurRad="38100" dist="25400" dir="5400000" algn="ctr" rotWithShape="0">
-                    <a:srgbClr val="6E747A">
-                      <a:alpha val="43000"/>
-                    </a:srgbClr>
-                  </a:outerShdw>
-                </a:effectLst>
-              </a:rPr>
-              <a:t>11]</a:t>
-            </a:r>
-          </a:p>
-        </p:txBody>
-      </p:sp>
-      <p:sp>
-        <p:nvSpPr>
-          <p:cNvPr id="66" name="Down Arrow 65">
-            <a:extLst>
-              <a:ext uri="{FF2B5EF4-FFF2-40B4-BE49-F238E27FC236}">
-                <a16:creationId xmlns:a16="http://schemas.microsoft.com/office/drawing/2014/main" id="{69BB6138-DE47-63B1-7AB2-A4762EC7E8F1}"/>
-              </a:ext>
-            </a:extLst>
-          </p:cNvPr>
-          <p:cNvSpPr/>
-          <p:nvPr/>
-        </p:nvSpPr>
-        <p:spPr>
-          <a:xfrm>
-            <a:off x="7416594" y="3163002"/>
-            <a:ext cx="641271" cy="286378"/>
-          </a:xfrm>
-          <a:prstGeom prst="downArrow">
-            <a:avLst/>
-          </a:prstGeom>
-        </p:spPr>
-        <p:style>
-          <a:lnRef idx="1">
-            <a:schemeClr val="accent1"/>
-          </a:lnRef>
-          <a:fillRef idx="2">
-            <a:schemeClr val="accent1"/>
-          </a:fillRef>
-          <a:effectRef idx="1">
-            <a:schemeClr val="accent1"/>
-          </a:effectRef>
-          <a:fontRef idx="minor">
-            <a:schemeClr val="dk1"/>
-          </a:fontRef>
-        </p:style>
-        <p:txBody>
-          <a:bodyPr rtlCol="0" anchor="ctr"/>
-          <a:lstStyle/>
-          <a:p>
-            <a:pPr algn="ctr"/>
-            <a:endParaRPr lang="en-CN"/>
-          </a:p>
-        </p:txBody>
-      </p:sp>
-      <p:sp>
-        <p:nvSpPr>
-          <p:cNvPr id="67" name="TextBox 66">
-            <a:extLst>
-              <a:ext uri="{FF2B5EF4-FFF2-40B4-BE49-F238E27FC236}">
-                <a16:creationId xmlns:a16="http://schemas.microsoft.com/office/drawing/2014/main" id="{78F509C7-A20E-9C54-6A9D-A380E5DAA1BE}"/>
-              </a:ext>
-            </a:extLst>
-          </p:cNvPr>
-          <p:cNvSpPr txBox="1"/>
-          <p:nvPr/>
-        </p:nvSpPr>
-        <p:spPr>
-          <a:xfrm>
-            <a:off x="7485621" y="3580008"/>
-            <a:ext cx="529312" cy="369332"/>
-          </a:xfrm>
-          <a:prstGeom prst="rect">
-            <a:avLst/>
-          </a:prstGeom>
-          <a:noFill/>
-        </p:spPr>
-        <p:txBody>
-          <a:bodyPr wrap="none" rtlCol="0">
-            <a:spAutoFit/>
-          </a:bodyPr>
-          <a:lstStyle/>
-          <a:p>
-            <a:r>
-              <a:rPr lang="en-US" altLang="zh-CN" dirty="0"/>
-              <a:t>0x1</a:t>
-            </a:r>
-            <a:endParaRPr lang="en-CN" dirty="0"/>
-          </a:p>
-        </p:txBody>
-      </p:sp>
-      <p:sp>
-        <p:nvSpPr>
-          <p:cNvPr id="68" name="TextBox 67">
-            <a:extLst>
-              <a:ext uri="{FF2B5EF4-FFF2-40B4-BE49-F238E27FC236}">
-                <a16:creationId xmlns:a16="http://schemas.microsoft.com/office/drawing/2014/main" id="{F02B0ECC-9FE5-4913-DBC9-42EB931E214C}"/>
-              </a:ext>
-            </a:extLst>
-          </p:cNvPr>
-          <p:cNvSpPr txBox="1"/>
-          <p:nvPr/>
-        </p:nvSpPr>
-        <p:spPr>
-          <a:xfrm>
-            <a:off x="8360103" y="4195749"/>
-            <a:ext cx="1805302" cy="369332"/>
-          </a:xfrm>
-          <a:prstGeom prst="rect">
-            <a:avLst/>
-          </a:prstGeom>
-          <a:noFill/>
-        </p:spPr>
-        <p:txBody>
-          <a:bodyPr wrap="none" rtlCol="0">
-            <a:spAutoFit/>
-          </a:bodyPr>
-          <a:lstStyle/>
-          <a:p>
-            <a:r>
-              <a:rPr lang="en-CN" dirty="0"/>
-              <a:t>0x表示</a:t>
-            </a:r>
-            <a:r>
-              <a:rPr lang="en-US" altLang="zh-CN" dirty="0"/>
-              <a:t>16</a:t>
-            </a:r>
-            <a:r>
-              <a:rPr lang="zh-CN" altLang="en-US" dirty="0"/>
-              <a:t>进制。</a:t>
-            </a:r>
-            <a:endParaRPr lang="en-CN" dirty="0"/>
-          </a:p>
-        </p:txBody>
-      </p:sp>
-    </p:spTree>
-    <p:extLst>
-      <p:ext uri="{BB962C8B-B14F-4D97-AF65-F5344CB8AC3E}">
-        <p14:creationId xmlns:p14="http://schemas.microsoft.com/office/powerpoint/2010/main" val="2242420439"/>
-      </p:ext>
-    </p:extLst>
-  </p:cSld>
-  <p:clrMapOvr>
-    <a:masterClrMapping/>
-  </p:clrMapOvr>
-</p:sld>
-</file>
-
 <file path=ppt/theme/theme1.xml><?xml version="1.0" encoding="utf-8"?>
 <a:theme xmlns:a="http://schemas.openxmlformats.org/drawingml/2006/main" name="Office 主题​​">
   <a:themeElements>

</xml_diff>